<commit_message>
mais caixinhas e textos
</commit_message>
<xml_diff>
--- a/doc/apresentacao_dissertacao.pptx
+++ b/doc/apresentacao_dissertacao.pptx
@@ -19536,7 +19536,7 @@
         </p:nvSpPr>
         <p:spPr>
           <a:xfrm>
-            <a:off x="1619672" y="1556792"/>
+            <a:off x="2339752" y="1403484"/>
             <a:ext cx="1368152" cy="360040"/>
           </a:xfrm>
           <a:prstGeom prst="rect">
@@ -19618,8 +19618,8 @@
         </p:nvSpPr>
         <p:spPr>
           <a:xfrm>
-            <a:off x="539552" y="3861048"/>
-            <a:ext cx="1368152" cy="720080"/>
+            <a:off x="395536" y="3861048"/>
+            <a:ext cx="1872208" cy="720080"/>
           </a:xfrm>
           <a:prstGeom prst="rect">
             <a:avLst/>
@@ -19659,7 +19659,7 @@
         </p:nvSpPr>
         <p:spPr>
           <a:xfrm>
-            <a:off x="2051720" y="3861048"/>
+            <a:off x="2411760" y="3861048"/>
             <a:ext cx="1368152" cy="720080"/>
           </a:xfrm>
           <a:prstGeom prst="rect">
@@ -19700,8 +19700,8 @@
         </p:nvSpPr>
         <p:spPr>
           <a:xfrm>
-            <a:off x="3635896" y="3861048"/>
-            <a:ext cx="1368152" cy="720080"/>
+            <a:off x="4139952" y="3861048"/>
+            <a:ext cx="1656184" cy="720080"/>
           </a:xfrm>
           <a:prstGeom prst="rect">
             <a:avLst/>
@@ -19742,7 +19742,7 @@
         <p:spPr>
           <a:xfrm>
             <a:off x="1259632" y="2996952"/>
-            <a:ext cx="1080120" cy="360040"/>
+            <a:ext cx="1368152" cy="432048"/>
           </a:xfrm>
           <a:prstGeom prst="rect">
             <a:avLst/>
@@ -19782,7 +19782,7 @@
         </p:nvSpPr>
         <p:spPr>
           <a:xfrm>
-            <a:off x="6012160" y="2276872"/>
+            <a:off x="6660232" y="2276872"/>
             <a:ext cx="1368152" cy="2304256"/>
           </a:xfrm>
           <a:prstGeom prst="rect">
@@ -19823,8 +19823,8 @@
         </p:nvSpPr>
         <p:spPr>
           <a:xfrm>
-            <a:off x="6012160" y="4005064"/>
-            <a:ext cx="1368152" cy="360040"/>
+            <a:off x="6444208" y="4725144"/>
+            <a:ext cx="1656184" cy="576064"/>
           </a:xfrm>
           <a:prstGeom prst="rect">
             <a:avLst/>
@@ -19864,7 +19864,7 @@
         </p:nvSpPr>
         <p:spPr>
           <a:xfrm>
-            <a:off x="6300192" y="3212976"/>
+            <a:off x="6948264" y="3645024"/>
             <a:ext cx="720080" cy="432048"/>
           </a:xfrm>
           <a:prstGeom prst="rect">
@@ -19905,7 +19905,7 @@
         </p:nvSpPr>
         <p:spPr>
           <a:xfrm>
-            <a:off x="6012160" y="1196752"/>
+            <a:off x="6372200" y="1196752"/>
             <a:ext cx="1800200" cy="648072"/>
           </a:xfrm>
           <a:prstGeom prst="rect">
@@ -19979,8 +19979,8 @@
         </p:nvCxnSpPr>
         <p:spPr>
           <a:xfrm>
-            <a:off x="395536" y="5013176"/>
-            <a:ext cx="7632848" cy="0"/>
+            <a:off x="395536" y="5445224"/>
+            <a:ext cx="7920880" cy="0"/>
           </a:xfrm>
           <a:prstGeom prst="line">
             <a:avLst/>
@@ -20015,7 +20015,7 @@
         </p:nvCxnSpPr>
         <p:spPr>
           <a:xfrm>
-            <a:off x="6012160" y="1520788"/>
+            <a:off x="6372200" y="1520788"/>
             <a:ext cx="1800200" cy="0"/>
           </a:xfrm>
           <a:prstGeom prst="line">
@@ -20045,7 +20045,7 @@
         </p:nvSpPr>
         <p:spPr>
           <a:xfrm>
-            <a:off x="6012160" y="1196752"/>
+            <a:off x="6372200" y="1196752"/>
             <a:ext cx="1800200" cy="646331"/>
           </a:xfrm>
           <a:prstGeom prst="rect">
@@ -20086,7 +20086,7 @@
         </p:nvSpPr>
         <p:spPr>
           <a:xfrm>
-            <a:off x="1691680" y="1556792"/>
+            <a:off x="2411760" y="1403484"/>
             <a:ext cx="1224136" cy="369332"/>
           </a:xfrm>
           <a:prstGeom prst="rect">
@@ -20133,6 +20133,299 @@
             <a:r>
               <a:rPr lang="pt-PT" dirty="0" smtClean="0"/>
               <a:t>API de Controlo</a:t>
+            </a:r>
+            <a:endParaRPr lang="pt-PT" dirty="0"/>
+          </a:p>
+        </p:txBody>
+      </p:sp>
+      <p:sp>
+        <p:nvSpPr>
+          <p:cNvPr id="26" name="CaixaDeTexto 25"/>
+          <p:cNvSpPr txBox="1"/>
+          <p:nvPr/>
+        </p:nvSpPr>
+        <p:spPr>
+          <a:xfrm>
+            <a:off x="1331640" y="3068960"/>
+            <a:ext cx="1296144" cy="369332"/>
+          </a:xfrm>
+          <a:prstGeom prst="rect">
+            <a:avLst/>
+          </a:prstGeom>
+          <a:noFill/>
+        </p:spPr>
+        <p:txBody>
+          <a:bodyPr wrap="square" rtlCol="0">
+            <a:spAutoFit/>
+          </a:bodyPr>
+          <a:lstStyle/>
+          <a:p>
+            <a:r>
+              <a:rPr lang="pt-PT" dirty="0" err="1" smtClean="0"/>
+              <a:t>KProbes</a:t>
+            </a:r>
+            <a:endParaRPr lang="pt-PT" dirty="0"/>
+          </a:p>
+        </p:txBody>
+      </p:sp>
+      <p:sp>
+        <p:nvSpPr>
+          <p:cNvPr id="28" name="CaixaDeTexto 27"/>
+          <p:cNvSpPr txBox="1"/>
+          <p:nvPr/>
+        </p:nvSpPr>
+        <p:spPr>
+          <a:xfrm>
+            <a:off x="4139952" y="3861048"/>
+            <a:ext cx="1872208" cy="584775"/>
+          </a:xfrm>
+          <a:prstGeom prst="rect">
+            <a:avLst/>
+          </a:prstGeom>
+          <a:noFill/>
+        </p:spPr>
+        <p:txBody>
+          <a:bodyPr wrap="square" rtlCol="0">
+            <a:spAutoFit/>
+          </a:bodyPr>
+          <a:lstStyle/>
+          <a:p>
+            <a:r>
+              <a:rPr lang="pt-PT" sz="1600" dirty="0" smtClean="0"/>
+              <a:t>Filtro de pacotes</a:t>
+            </a:r>
+          </a:p>
+          <a:p>
+            <a:r>
+              <a:rPr lang="pt-PT" sz="1600" dirty="0" smtClean="0"/>
+              <a:t>Ligação ao LSF</a:t>
+            </a:r>
+            <a:endParaRPr lang="pt-PT" sz="2000" dirty="0"/>
+          </a:p>
+        </p:txBody>
+      </p:sp>
+      <p:sp>
+        <p:nvSpPr>
+          <p:cNvPr id="29" name="CaixaDeTexto 28"/>
+          <p:cNvSpPr txBox="1"/>
+          <p:nvPr/>
+        </p:nvSpPr>
+        <p:spPr>
+          <a:xfrm>
+            <a:off x="2411760" y="3933056"/>
+            <a:ext cx="1296144" cy="646331"/>
+          </a:xfrm>
+          <a:prstGeom prst="rect">
+            <a:avLst/>
+          </a:prstGeom>
+          <a:noFill/>
+        </p:spPr>
+        <p:txBody>
+          <a:bodyPr wrap="square" rtlCol="0">
+            <a:spAutoFit/>
+          </a:bodyPr>
+          <a:lstStyle/>
+          <a:p>
+            <a:r>
+              <a:rPr lang="pt-PT" dirty="0" smtClean="0"/>
+              <a:t>Estado do</a:t>
+            </a:r>
+          </a:p>
+          <a:p>
+            <a:r>
+              <a:rPr lang="pt-PT" dirty="0" smtClean="0"/>
+              <a:t>processo</a:t>
+            </a:r>
+            <a:endParaRPr lang="pt-PT" dirty="0"/>
+          </a:p>
+        </p:txBody>
+      </p:sp>
+      <p:sp>
+        <p:nvSpPr>
+          <p:cNvPr id="30" name="CaixaDeTexto 29"/>
+          <p:cNvSpPr txBox="1"/>
+          <p:nvPr/>
+        </p:nvSpPr>
+        <p:spPr>
+          <a:xfrm>
+            <a:off x="467544" y="3861048"/>
+            <a:ext cx="1728192" cy="830997"/>
+          </a:xfrm>
+          <a:prstGeom prst="rect">
+            <a:avLst/>
+          </a:prstGeom>
+          <a:noFill/>
+        </p:spPr>
+        <p:txBody>
+          <a:bodyPr wrap="square" rtlCol="0">
+            <a:spAutoFit/>
+          </a:bodyPr>
+          <a:lstStyle/>
+          <a:p>
+            <a:r>
+              <a:rPr lang="pt-PT" sz="1600" dirty="0" smtClean="0"/>
+              <a:t>Instrumentação das chamadas ao sistema</a:t>
+            </a:r>
+            <a:endParaRPr lang="pt-PT" sz="1600" dirty="0"/>
+          </a:p>
+        </p:txBody>
+      </p:sp>
+      <p:sp>
+        <p:nvSpPr>
+          <p:cNvPr id="31" name="CaixaDeTexto 30"/>
+          <p:cNvSpPr txBox="1"/>
+          <p:nvPr/>
+        </p:nvSpPr>
+        <p:spPr>
+          <a:xfrm>
+            <a:off x="6948264" y="3645024"/>
+            <a:ext cx="864096" cy="369332"/>
+          </a:xfrm>
+          <a:prstGeom prst="rect">
+            <a:avLst/>
+          </a:prstGeom>
+          <a:noFill/>
+        </p:spPr>
+        <p:txBody>
+          <a:bodyPr wrap="square" rtlCol="0">
+            <a:spAutoFit/>
+          </a:bodyPr>
+          <a:lstStyle/>
+          <a:p>
+            <a:r>
+              <a:rPr lang="pt-PT" dirty="0" err="1" smtClean="0"/>
+              <a:t>Hook</a:t>
+            </a:r>
+            <a:endParaRPr lang="pt-PT" dirty="0"/>
+          </a:p>
+        </p:txBody>
+      </p:sp>
+      <p:sp>
+        <p:nvSpPr>
+          <p:cNvPr id="32" name="CaixaDeTexto 31"/>
+          <p:cNvSpPr txBox="1"/>
+          <p:nvPr/>
+        </p:nvSpPr>
+        <p:spPr>
+          <a:xfrm>
+            <a:off x="6660232" y="2420888"/>
+            <a:ext cx="1368152" cy="338554"/>
+          </a:xfrm>
+          <a:prstGeom prst="rect">
+            <a:avLst/>
+          </a:prstGeom>
+          <a:noFill/>
+        </p:spPr>
+        <p:txBody>
+          <a:bodyPr wrap="square" rtlCol="0">
+            <a:spAutoFit/>
+          </a:bodyPr>
+          <a:lstStyle/>
+          <a:p>
+            <a:r>
+              <a:rPr lang="pt-PT" sz="1600" dirty="0" smtClean="0"/>
+              <a:t>AF_PACKET</a:t>
+            </a:r>
+            <a:endParaRPr lang="pt-PT" sz="1600" dirty="0"/>
+          </a:p>
+        </p:txBody>
+      </p:sp>
+      <p:sp>
+        <p:nvSpPr>
+          <p:cNvPr id="33" name="CaixaDeTexto 32"/>
+          <p:cNvSpPr txBox="1"/>
+          <p:nvPr/>
+        </p:nvSpPr>
+        <p:spPr>
+          <a:xfrm>
+            <a:off x="6444208" y="4725144"/>
+            <a:ext cx="1728192" cy="646331"/>
+          </a:xfrm>
+          <a:prstGeom prst="rect">
+            <a:avLst/>
+          </a:prstGeom>
+          <a:noFill/>
+        </p:spPr>
+        <p:txBody>
+          <a:bodyPr wrap="square" rtlCol="0">
+            <a:spAutoFit/>
+          </a:bodyPr>
+          <a:lstStyle/>
+          <a:p>
+            <a:r>
+              <a:rPr lang="pt-PT" dirty="0" smtClean="0"/>
+              <a:t>Controlador da placa de rede</a:t>
+            </a:r>
+            <a:endParaRPr lang="pt-PT" dirty="0"/>
+          </a:p>
+        </p:txBody>
+      </p:sp>
+      <p:sp>
+        <p:nvSpPr>
+          <p:cNvPr id="35" name="Rectângulo 34"/>
+          <p:cNvSpPr/>
+          <p:nvPr/>
+        </p:nvSpPr>
+        <p:spPr>
+          <a:xfrm>
+            <a:off x="6444208" y="5661248"/>
+            <a:ext cx="1656184" cy="576064"/>
+          </a:xfrm>
+          <a:prstGeom prst="rect">
+            <a:avLst/>
+          </a:prstGeom>
+          <a:noFill/>
+        </p:spPr>
+        <p:style>
+          <a:lnRef idx="2">
+            <a:schemeClr val="accent1">
+              <a:shade val="50000"/>
+            </a:schemeClr>
+          </a:lnRef>
+          <a:fillRef idx="1">
+            <a:schemeClr val="accent1"/>
+          </a:fillRef>
+          <a:effectRef idx="0">
+            <a:schemeClr val="accent1"/>
+          </a:effectRef>
+          <a:fontRef idx="minor">
+            <a:schemeClr val="lt1"/>
+          </a:fontRef>
+        </p:style>
+        <p:txBody>
+          <a:bodyPr rtlCol="0" anchor="ctr"/>
+          <a:lstStyle/>
+          <a:p>
+            <a:pPr algn="ctr"/>
+            <a:endParaRPr lang="pt-PT"/>
+          </a:p>
+        </p:txBody>
+      </p:sp>
+      <p:sp>
+        <p:nvSpPr>
+          <p:cNvPr id="36" name="CaixaDeTexto 35"/>
+          <p:cNvSpPr txBox="1"/>
+          <p:nvPr/>
+        </p:nvSpPr>
+        <p:spPr>
+          <a:xfrm>
+            <a:off x="6444208" y="5795972"/>
+            <a:ext cx="1656184" cy="369332"/>
+          </a:xfrm>
+          <a:prstGeom prst="rect">
+            <a:avLst/>
+          </a:prstGeom>
+          <a:noFill/>
+        </p:spPr>
+        <p:txBody>
+          <a:bodyPr wrap="square" rtlCol="0">
+            <a:spAutoFit/>
+          </a:bodyPr>
+          <a:lstStyle/>
+          <a:p>
+            <a:r>
+              <a:rPr lang="pt-PT" dirty="0" smtClean="0"/>
+              <a:t>Placa de rede</a:t>
             </a:r>
             <a:endParaRPr lang="pt-PT" dirty="0"/>
           </a:p>

</xml_diff>

<commit_message>
adicionados testes e cores na arquitectura
</commit_message>
<xml_diff>
--- a/doc/apresentacao_dissertacao.pptx
+++ b/doc/apresentacao_dissertacao.pptx
@@ -5,10 +5,10 @@
     <p:sldMasterId id="2147483660" r:id="rId1"/>
   </p:sldMasterIdLst>
   <p:notesMasterIdLst>
-    <p:notesMasterId r:id="rId32"/>
+    <p:notesMasterId r:id="rId33"/>
   </p:notesMasterIdLst>
   <p:handoutMasterIdLst>
-    <p:handoutMasterId r:id="rId33"/>
+    <p:handoutMasterId r:id="rId34"/>
   </p:handoutMasterIdLst>
   <p:sldIdLst>
     <p:sldId id="256" r:id="rId2"/>
@@ -29,18 +29,19 @@
     <p:sldId id="295" r:id="rId17"/>
     <p:sldId id="301" r:id="rId18"/>
     <p:sldId id="271" r:id="rId19"/>
-    <p:sldId id="297" r:id="rId20"/>
-    <p:sldId id="286" r:id="rId21"/>
+    <p:sldId id="302" r:id="rId20"/>
+    <p:sldId id="297" r:id="rId21"/>
     <p:sldId id="283" r:id="rId22"/>
     <p:sldId id="284" r:id="rId23"/>
-    <p:sldId id="282" r:id="rId24"/>
-    <p:sldId id="281" r:id="rId25"/>
-    <p:sldId id="265" r:id="rId26"/>
-    <p:sldId id="291" r:id="rId27"/>
-    <p:sldId id="285" r:id="rId28"/>
-    <p:sldId id="261" r:id="rId29"/>
-    <p:sldId id="259" r:id="rId30"/>
-    <p:sldId id="268" r:id="rId31"/>
+    <p:sldId id="286" r:id="rId24"/>
+    <p:sldId id="282" r:id="rId25"/>
+    <p:sldId id="281" r:id="rId26"/>
+    <p:sldId id="265" r:id="rId27"/>
+    <p:sldId id="291" r:id="rId28"/>
+    <p:sldId id="285" r:id="rId29"/>
+    <p:sldId id="261" r:id="rId30"/>
+    <p:sldId id="259" r:id="rId31"/>
+    <p:sldId id="268" r:id="rId32"/>
   </p:sldIdLst>
   <p:sldSz cx="9144000" cy="6858000" type="screen4x3"/>
   <p:notesSz cx="9874250" cy="6797675"/>
@@ -439,6 +440,7 @@
     </c:plotArea>
     <c:legend>
       <c:legendPos val="r"/>
+      <c:layout/>
     </c:legend>
     <c:plotVisOnly val="1"/>
     <c:dispBlanksAs val="gap"/>
@@ -613,6 +615,7 @@
               </a:p>
             </c:rich>
           </c:tx>
+          <c:layout/>
         </c:title>
         <c:numFmt formatCode="General" sourceLinked="1"/>
         <c:tickLblPos val="nextTo"/>
@@ -650,6 +653,7 @@
               </a:p>
             </c:rich>
           </c:tx>
+          <c:layout/>
         </c:title>
         <c:numFmt formatCode="0.0" sourceLinked="0"/>
         <c:tickLblPos val="nextTo"/>
@@ -660,6 +664,7 @@
     </c:plotArea>
     <c:legend>
       <c:legendPos val="r"/>
+      <c:layout/>
     </c:legend>
     <c:plotVisOnly val="1"/>
     <c:dispBlanksAs val="gap"/>
@@ -838,6 +843,7 @@
               </a:p>
             </c:rich>
           </c:tx>
+          <c:layout/>
         </c:title>
         <c:numFmt formatCode="General" sourceLinked="1"/>
         <c:tickLblPos val="nextTo"/>
@@ -1016,6 +1022,7 @@
               </a:p>
             </c:rich>
           </c:tx>
+          <c:layout/>
         </c:title>
         <c:numFmt formatCode="General" sourceLinked="1"/>
         <c:tickLblPos val="nextTo"/>
@@ -1041,6 +1048,7 @@
     </c:plotArea>
     <c:legend>
       <c:legendPos val="r"/>
+      <c:layout/>
     </c:legend>
     <c:plotVisOnly val="1"/>
     <c:dispBlanksAs val="gap"/>
@@ -2231,7 +2239,7 @@
             <a:fld id="{CB697A11-5CEE-4588-B832-132CDC30A066}" type="slidenum">
               <a:rPr lang="pt-PT" smtClean="0"/>
               <a:pPr/>
-              <a:t>28</a:t>
+              <a:t>29</a:t>
             </a:fld>
             <a:endParaRPr lang="pt-PT"/>
           </a:p>
@@ -2397,7 +2405,7 @@
             <a:fld id="{CB697A11-5CEE-4588-B832-132CDC30A066}" type="slidenum">
               <a:rPr lang="pt-PT" smtClean="0"/>
               <a:pPr/>
-              <a:t>29</a:t>
+              <a:t>30</a:t>
             </a:fld>
             <a:endParaRPr lang="pt-PT"/>
           </a:p>
@@ -2599,7 +2607,7 @@
             <a:fld id="{CB697A11-5CEE-4588-B832-132CDC30A066}" type="slidenum">
               <a:rPr lang="pt-PT" smtClean="0"/>
               <a:pPr/>
-              <a:t>30</a:t>
+              <a:t>31</a:t>
             </a:fld>
             <a:endParaRPr lang="pt-PT"/>
           </a:p>
@@ -12293,7 +12301,7 @@
 </file>
 
 <file path=ppt/slides/slide17.xml><?xml version="1.0" encoding="utf-8"?>
-<p:sld xmlns:a="http://schemas.openxmlformats.org/drawingml/2006/main" xmlns:r="http://schemas.openxmlformats.org/officeDocument/2006/relationships" xmlns:p="http://schemas.openxmlformats.org/presentationml/2006/main">
+<p:sld xmlns:a="http://schemas.openxmlformats.org/drawingml/2006/main" xmlns:r="http://schemas.openxmlformats.org/officeDocument/2006/relationships" xmlns:p="http://schemas.openxmlformats.org/presentationml/2006/main" show="0">
   <p:cSld>
     <p:spTree>
       <p:nvGrpSpPr>
@@ -12380,6 +12388,7 @@
   <p:clrMapOvr>
     <a:masterClrMapping/>
   </p:clrMapOvr>
+  <p:transition/>
   <p:timing>
     <p:tnLst>
       <p:par>
@@ -12453,7 +12462,7 @@
         </p:spPr>
         <p:txBody>
           <a:bodyPr>
-            <a:normAutofit fontScale="92500" lnSpcReduction="10000"/>
+            <a:normAutofit/>
           </a:bodyPr>
           <a:lstStyle/>
           <a:p>
@@ -12521,65 +12530,6 @@
           <a:p>
             <a:pPr lvl="1"/>
             <a:endParaRPr lang="pt-PT" dirty="0" smtClean="0"/>
-          </a:p>
-          <a:p>
-            <a:r>
-              <a:rPr lang="pt-PT" dirty="0" smtClean="0"/>
-              <a:t>Avaliação de desempenho</a:t>
-            </a:r>
-          </a:p>
-          <a:p>
-            <a:pPr lvl="1"/>
-            <a:r>
-              <a:rPr lang="en-US" dirty="0" smtClean="0"/>
-              <a:t>S</a:t>
-            </a:r>
-            <a:r>
-              <a:rPr lang="pt-PT" dirty="0" err="1" smtClean="0"/>
-              <a:t>obrecarga</a:t>
-            </a:r>
-            <a:r>
-              <a:rPr lang="pt-PT" dirty="0" smtClean="0"/>
-              <a:t> introduzida pela instrumentação do processo</a:t>
-            </a:r>
-          </a:p>
-          <a:p>
-            <a:pPr lvl="1"/>
-            <a:r>
-              <a:rPr lang="en-US" dirty="0" smtClean="0"/>
-              <a:t>S</a:t>
-            </a:r>
-            <a:r>
-              <a:rPr lang="pt-PT" dirty="0" err="1" smtClean="0"/>
-              <a:t>obrecarga</a:t>
-            </a:r>
-            <a:r>
-              <a:rPr lang="pt-PT" dirty="0" smtClean="0"/>
-              <a:t> face ao sistema original</a:t>
-            </a:r>
-          </a:p>
-          <a:p>
-            <a:pPr lvl="2"/>
-            <a:r>
-              <a:rPr lang="en-US" dirty="0" smtClean="0"/>
-              <a:t>C</a:t>
-            </a:r>
-            <a:r>
-              <a:rPr lang="pt-PT" dirty="0" err="1" smtClean="0"/>
-              <a:t>aptura</a:t>
-            </a:r>
-            <a:r>
-              <a:rPr lang="pt-PT" dirty="0" smtClean="0"/>
-              <a:t> de tráfego usando </a:t>
-            </a:r>
-            <a:r>
-              <a:rPr lang="pt-PT" dirty="0" err="1" smtClean="0"/>
-              <a:t>tcpdump</a:t>
-            </a:r>
-            <a:r>
-              <a:rPr lang="pt-PT" dirty="0" smtClean="0"/>
-              <a:t> em testes de transferência de grandes volumes de dados</a:t>
-            </a:r>
           </a:p>
           <a:p>
             <a:pPr lvl="2"/>
@@ -12665,7 +12615,7 @@
           <a:p>
             <a:r>
               <a:rPr lang="pt-PT" dirty="0" smtClean="0"/>
-              <a:t>Avaliação II</a:t>
+              <a:t>Avaliação</a:t>
             </a:r>
             <a:endParaRPr lang="pt-PT" dirty="0"/>
           </a:p>
@@ -12695,8 +12645,69 @@
           <a:p>
             <a:r>
               <a:rPr lang="pt-PT" dirty="0" smtClean="0"/>
-              <a:t>Explicar os diversos testes …..</a:t>
-            </a:r>
+              <a:t>Avaliação </a:t>
+            </a:r>
+            <a:r>
+              <a:rPr lang="pt-PT" dirty="0" smtClean="0"/>
+              <a:t>de desempenho</a:t>
+            </a:r>
+          </a:p>
+          <a:p>
+            <a:pPr lvl="1"/>
+            <a:r>
+              <a:rPr lang="en-US" dirty="0" smtClean="0"/>
+              <a:t>S</a:t>
+            </a:r>
+            <a:r>
+              <a:rPr lang="pt-PT" dirty="0" err="1" smtClean="0"/>
+              <a:t>obrecarga</a:t>
+            </a:r>
+            <a:r>
+              <a:rPr lang="pt-PT" dirty="0" smtClean="0"/>
+              <a:t> face ao sistema original</a:t>
+            </a:r>
+          </a:p>
+          <a:p>
+            <a:pPr lvl="2"/>
+            <a:r>
+              <a:rPr lang="en-US" dirty="0" smtClean="0"/>
+              <a:t>C</a:t>
+            </a:r>
+            <a:r>
+              <a:rPr lang="pt-PT" dirty="0" err="1" smtClean="0"/>
+              <a:t>aptura</a:t>
+            </a:r>
+            <a:r>
+              <a:rPr lang="pt-PT" dirty="0" smtClean="0"/>
+              <a:t> de tráfego usando </a:t>
+            </a:r>
+            <a:r>
+              <a:rPr lang="pt-PT" dirty="0" err="1" smtClean="0"/>
+              <a:t>tcpdump</a:t>
+            </a:r>
+            <a:r>
+              <a:rPr lang="pt-PT" dirty="0" smtClean="0"/>
+              <a:t> em testes de transferência de grandes volumes de dados</a:t>
+            </a:r>
+          </a:p>
+          <a:p>
+            <a:pPr lvl="1"/>
+            <a:r>
+              <a:rPr lang="en-US" dirty="0" smtClean="0"/>
+              <a:t>S</a:t>
+            </a:r>
+            <a:r>
+              <a:rPr lang="pt-PT" dirty="0" err="1" smtClean="0"/>
+              <a:t>obrecarga</a:t>
+            </a:r>
+            <a:r>
+              <a:rPr lang="pt-PT" dirty="0" smtClean="0"/>
+              <a:t> introduzida pela instrumentação do processo</a:t>
+            </a:r>
+          </a:p>
+          <a:p>
+            <a:pPr lvl="2"/>
+            <a:endParaRPr lang="pt-PT" dirty="0" smtClean="0"/>
           </a:p>
           <a:p>
             <a:pPr lvl="1"/>
@@ -12900,7 +12911,7 @@
         </p:nvSpPr>
         <p:spPr>
           <a:xfrm>
-            <a:off x="457200" y="476672"/>
+            <a:off x="457200" y="260648"/>
             <a:ext cx="8229600" cy="1066800"/>
           </a:xfrm>
         </p:spPr>
@@ -12910,7 +12921,11 @@
           <a:p>
             <a:r>
               <a:rPr lang="pt-PT" dirty="0" smtClean="0"/>
-              <a:t>Avaliação de desempenho (II)</a:t>
+              <a:t>Avaliação </a:t>
+            </a:r>
+            <a:r>
+              <a:rPr lang="pt-PT" dirty="0" smtClean="0"/>
+              <a:t>de desempenho</a:t>
             </a:r>
             <a:endParaRPr lang="pt-PT" dirty="0"/>
           </a:p>
@@ -12928,99 +12943,91 @@
         </p:nvSpPr>
         <p:spPr>
           <a:xfrm>
-            <a:off x="467544" y="1412776"/>
-            <a:ext cx="8229600" cy="5157192"/>
-          </a:xfrm>
-        </p:spPr>
-        <p:txBody>
-          <a:bodyPr/>
+            <a:off x="323528" y="1412776"/>
+            <a:ext cx="8229600" cy="5472608"/>
+          </a:xfrm>
+        </p:spPr>
+        <p:txBody>
+          <a:bodyPr>
+            <a:normAutofit/>
+          </a:bodyPr>
           <a:lstStyle/>
           <a:p>
             <a:r>
               <a:rPr lang="pt-PT" dirty="0" smtClean="0"/>
-              <a:t>Avaliação da sobrecarga introduzida</a:t>
-            </a:r>
+              <a:t>Duas máquinas ligadas </a:t>
+            </a:r>
+            <a:r>
+              <a:rPr lang="pt-PT" dirty="0" err="1" smtClean="0"/>
+              <a:t>directamente</a:t>
+            </a:r>
+            <a:endParaRPr lang="pt-PT" dirty="0" smtClean="0"/>
+          </a:p>
+          <a:p>
+            <a:r>
+              <a:rPr lang="pt-PT" dirty="0" smtClean="0"/>
+              <a:t>Desempenho na transferência de 1 GB de dados através dos protocolos </a:t>
+            </a:r>
+            <a:r>
+              <a:rPr lang="pt-PT" dirty="0" err="1" smtClean="0"/>
+              <a:t>ftp</a:t>
+            </a:r>
+            <a:r>
+              <a:rPr lang="pt-PT" dirty="0" smtClean="0"/>
+              <a:t> e </a:t>
+            </a:r>
+            <a:r>
+              <a:rPr lang="pt-PT" dirty="0" err="1" smtClean="0"/>
+              <a:t>http</a:t>
+            </a:r>
+            <a:endParaRPr lang="pt-PT" dirty="0" smtClean="0"/>
           </a:p>
           <a:p>
             <a:pPr lvl="1"/>
             <a:r>
               <a:rPr lang="pt-PT" dirty="0" smtClean="0"/>
-              <a:t>Instrumentação com </a:t>
+              <a:t>Capturar todo o tráfego através da biblioteca </a:t>
             </a:r>
             <a:r>
               <a:rPr lang="pt-PT" dirty="0" err="1" smtClean="0"/>
-              <a:t>KProbe</a:t>
+              <a:t>PCap</a:t>
             </a:r>
             <a:r>
               <a:rPr lang="pt-PT" dirty="0" smtClean="0"/>
-              <a:t> da chamada ao sistema </a:t>
+              <a:t> com recurso </a:t>
+            </a:r>
+          </a:p>
+          <a:p>
+            <a:pPr lvl="1"/>
+            <a:r>
+              <a:rPr lang="pt-PT" dirty="0" smtClean="0"/>
+              <a:t>Capturar através do filtro dinâmico</a:t>
+            </a:r>
+          </a:p>
+          <a:p>
+            <a:r>
+              <a:rPr lang="pt-PT" dirty="0" smtClean="0"/>
+              <a:t>Dois fluxos de dados onde se captura apenas um através do recurso ao filtro dinâmico</a:t>
+            </a:r>
+          </a:p>
+          <a:p>
+            <a:pPr lvl="1"/>
+            <a:r>
+              <a:rPr lang="pt-PT" dirty="0" smtClean="0"/>
+              <a:t>A filtragem em nível utilizador ou através dos filtros estáticos do </a:t>
             </a:r>
             <a:r>
               <a:rPr lang="pt-PT" dirty="0" err="1" smtClean="0"/>
-              <a:t>getpid</a:t>
+              <a:t>PCap</a:t>
+            </a:r>
+            <a:r>
+              <a:rPr lang="pt-PT" dirty="0" smtClean="0"/>
+              <a:t> aumenta a sobrecarga</a:t>
             </a:r>
             <a:endParaRPr lang="pt-PT" dirty="0" smtClean="0"/>
           </a:p>
           <a:p>
-            <a:pPr lvl="1">
-              <a:buNone/>
-            </a:pPr>
-            <a:r>
-              <a:rPr lang="pt-PT" dirty="0" smtClean="0"/>
-              <a:t>                           </a:t>
-            </a:r>
-            <a:r>
-              <a:rPr lang="pt-PT" sz="1400" dirty="0" smtClean="0"/>
-              <a:t>Tempos médios por chamada (</a:t>
-            </a:r>
-            <a:r>
-              <a:rPr lang="pt-PT" sz="1400" dirty="0" err="1" smtClean="0"/>
-              <a:t>micro-segundos</a:t>
-            </a:r>
-            <a:r>
-              <a:rPr lang="pt-PT" sz="1400" dirty="0" smtClean="0"/>
-              <a:t>)</a:t>
-            </a:r>
-            <a:endParaRPr lang="pt-PT" dirty="0" smtClean="0"/>
-          </a:p>
-          <a:p>
-            <a:pPr lvl="1"/>
-            <a:endParaRPr lang="pt-PT" dirty="0" smtClean="0"/>
-          </a:p>
-          <a:p>
-            <a:pPr lvl="1">
-              <a:buNone/>
-            </a:pPr>
-            <a:endParaRPr lang="en-US" dirty="0" smtClean="0"/>
-          </a:p>
-          <a:p>
-            <a:pPr lvl="1"/>
-            <a:endParaRPr lang="en-US" sz="1200" dirty="0" smtClean="0"/>
-          </a:p>
-          <a:p>
-            <a:pPr lvl="1"/>
-            <a:r>
-              <a:rPr lang="en-US" dirty="0" err="1" smtClean="0"/>
-              <a:t>Simulação</a:t>
-            </a:r>
-            <a:r>
-              <a:rPr lang="en-US" dirty="0" smtClean="0"/>
-              <a:t> d</a:t>
-            </a:r>
-            <a:r>
-              <a:rPr lang="pt-PT" dirty="0" smtClean="0"/>
-              <a:t>a criação e destruição de </a:t>
-            </a:r>
-            <a:r>
-              <a:rPr lang="pt-PT" dirty="0" err="1" smtClean="0"/>
-              <a:t>sockets</a:t>
-            </a:r>
-            <a:endParaRPr lang="pt-PT" dirty="0" smtClean="0"/>
-          </a:p>
-          <a:p>
-            <a:pPr lvl="1">
-              <a:buNone/>
-            </a:pPr>
+            <a:pPr lvl="2"/>
             <a:endParaRPr lang="pt-PT" dirty="0" smtClean="0"/>
           </a:p>
         </p:txBody>
@@ -13044,6 +13051,443 @@
               <a:rPr lang="pt-PT" smtClean="0"/>
               <a:pPr/>
               <a:t>20</a:t>
+            </a:fld>
+            <a:endParaRPr lang="pt-PT"/>
+          </a:p>
+        </p:txBody>
+      </p:sp>
+    </p:spTree>
+  </p:cSld>
+  <p:clrMapOvr>
+    <a:masterClrMapping/>
+  </p:clrMapOvr>
+  <p:timing>
+    <p:tnLst>
+      <p:par>
+        <p:cTn id="1" dur="indefinite" restart="never" nodeType="tmRoot"/>
+      </p:par>
+    </p:tnLst>
+  </p:timing>
+</p:sld>
+</file>
+
+<file path=ppt/slides/slide21.xml><?xml version="1.0" encoding="utf-8"?>
+<p:sld xmlns:a="http://schemas.openxmlformats.org/drawingml/2006/main" xmlns:r="http://schemas.openxmlformats.org/officeDocument/2006/relationships" xmlns:p="http://schemas.openxmlformats.org/presentationml/2006/main">
+  <p:cSld>
+    <p:spTree>
+      <p:nvGrpSpPr>
+        <p:cNvPr id="1" name=""/>
+        <p:cNvGrpSpPr/>
+        <p:nvPr/>
+      </p:nvGrpSpPr>
+      <p:grpSpPr>
+        <a:xfrm>
+          <a:off x="0" y="0"/>
+          <a:ext cx="0" cy="0"/>
+          <a:chOff x="0" y="0"/>
+          <a:chExt cx="0" cy="0"/>
+        </a:xfrm>
+      </p:grpSpPr>
+      <p:sp>
+        <p:nvSpPr>
+          <p:cNvPr id="2" name="Título 1"/>
+          <p:cNvSpPr>
+            <a:spLocks noGrp="1"/>
+          </p:cNvSpPr>
+          <p:nvPr>
+            <p:ph type="title"/>
+          </p:nvPr>
+        </p:nvSpPr>
+        <p:spPr>
+          <a:xfrm>
+            <a:off x="35496" y="404664"/>
+            <a:ext cx="8229600" cy="1066800"/>
+          </a:xfrm>
+        </p:spPr>
+        <p:txBody>
+          <a:bodyPr>
+            <a:normAutofit/>
+          </a:bodyPr>
+          <a:lstStyle/>
+          <a:p>
+            <a:r>
+              <a:rPr lang="pt-PT" smtClean="0"/>
+              <a:t>Avaliação de desempenho (III)</a:t>
+            </a:r>
+            <a:endParaRPr lang="pt-PT"/>
+          </a:p>
+        </p:txBody>
+      </p:sp>
+      <p:sp>
+        <p:nvSpPr>
+          <p:cNvPr id="5" name="Marcador de Posição do Número do Diapositivo 4"/>
+          <p:cNvSpPr>
+            <a:spLocks noGrp="1"/>
+          </p:cNvSpPr>
+          <p:nvPr>
+            <p:ph type="sldNum" sz="quarter" idx="12"/>
+          </p:nvPr>
+        </p:nvSpPr>
+        <p:spPr/>
+        <p:txBody>
+          <a:bodyPr/>
+          <a:lstStyle/>
+          <a:p>
+            <a:fld id="{AC560869-1695-4081-8E6F-05D0DB8947D3}" type="slidenum">
+              <a:rPr lang="pt-PT" smtClean="0"/>
+              <a:pPr/>
+              <a:t>21</a:t>
+            </a:fld>
+            <a:endParaRPr lang="pt-PT"/>
+          </a:p>
+        </p:txBody>
+      </p:sp>
+      <p:graphicFrame>
+        <p:nvGraphicFramePr>
+          <p:cNvPr id="6" name="Gráfico 5"/>
+          <p:cNvGraphicFramePr>
+            <a:graphicFrameLocks/>
+          </p:cNvGraphicFramePr>
+          <p:nvPr/>
+        </p:nvGraphicFramePr>
+        <p:xfrm>
+          <a:off x="251520" y="2420888"/>
+          <a:ext cx="8496944" cy="4057650"/>
+        </p:xfrm>
+        <a:graphic>
+          <a:graphicData uri="http://schemas.openxmlformats.org/drawingml/2006/chart">
+            <c:chart xmlns:c="http://schemas.openxmlformats.org/drawingml/2006/chart" xmlns:r="http://schemas.openxmlformats.org/officeDocument/2006/relationships" r:id="rId2"/>
+          </a:graphicData>
+        </a:graphic>
+      </p:graphicFrame>
+    </p:spTree>
+  </p:cSld>
+  <p:clrMapOvr>
+    <a:masterClrMapping/>
+  </p:clrMapOvr>
+  <p:timing>
+    <p:tnLst>
+      <p:par>
+        <p:cTn id="1" dur="indefinite" restart="never" nodeType="tmRoot"/>
+      </p:par>
+    </p:tnLst>
+  </p:timing>
+</p:sld>
+</file>
+
+<file path=ppt/slides/slide22.xml><?xml version="1.0" encoding="utf-8"?>
+<p:sld xmlns:a="http://schemas.openxmlformats.org/drawingml/2006/main" xmlns:r="http://schemas.openxmlformats.org/officeDocument/2006/relationships" xmlns:p="http://schemas.openxmlformats.org/presentationml/2006/main">
+  <p:cSld>
+    <p:spTree>
+      <p:nvGrpSpPr>
+        <p:cNvPr id="1" name=""/>
+        <p:cNvGrpSpPr/>
+        <p:nvPr/>
+      </p:nvGrpSpPr>
+      <p:grpSpPr>
+        <a:xfrm>
+          <a:off x="0" y="0"/>
+          <a:ext cx="0" cy="0"/>
+          <a:chOff x="0" y="0"/>
+          <a:chExt cx="0" cy="0"/>
+        </a:xfrm>
+      </p:grpSpPr>
+      <p:sp>
+        <p:nvSpPr>
+          <p:cNvPr id="2" name="Título 1"/>
+          <p:cNvSpPr>
+            <a:spLocks noGrp="1"/>
+          </p:cNvSpPr>
+          <p:nvPr>
+            <p:ph type="title"/>
+          </p:nvPr>
+        </p:nvSpPr>
+        <p:spPr>
+          <a:xfrm>
+            <a:off x="35496" y="404664"/>
+            <a:ext cx="8229600" cy="1066800"/>
+          </a:xfrm>
+        </p:spPr>
+        <p:txBody>
+          <a:bodyPr>
+            <a:normAutofit/>
+          </a:bodyPr>
+          <a:lstStyle/>
+          <a:p>
+            <a:r>
+              <a:rPr lang="pt-PT" smtClean="0"/>
+              <a:t>Avaliação de desempenho (IV)</a:t>
+            </a:r>
+            <a:endParaRPr lang="pt-PT"/>
+          </a:p>
+        </p:txBody>
+      </p:sp>
+      <p:sp>
+        <p:nvSpPr>
+          <p:cNvPr id="5" name="Marcador de Posição do Número do Diapositivo 4"/>
+          <p:cNvSpPr>
+            <a:spLocks noGrp="1"/>
+          </p:cNvSpPr>
+          <p:nvPr>
+            <p:ph type="sldNum" sz="quarter" idx="12"/>
+          </p:nvPr>
+        </p:nvSpPr>
+        <p:spPr/>
+        <p:txBody>
+          <a:bodyPr/>
+          <a:lstStyle/>
+          <a:p>
+            <a:fld id="{AC560869-1695-4081-8E6F-05D0DB8947D3}" type="slidenum">
+              <a:rPr lang="pt-PT" smtClean="0"/>
+              <a:pPr/>
+              <a:t>22</a:t>
+            </a:fld>
+            <a:endParaRPr lang="pt-PT"/>
+          </a:p>
+        </p:txBody>
+      </p:sp>
+      <p:graphicFrame>
+        <p:nvGraphicFramePr>
+          <p:cNvPr id="7" name="Gráfico 6"/>
+          <p:cNvGraphicFramePr>
+            <a:graphicFrameLocks/>
+          </p:cNvGraphicFramePr>
+          <p:nvPr>
+            <p:extLst>
+              <p:ext uri="{D42A27DB-BD31-4B8C-83A1-F6EECF244321}">
+                <p14:modId xmlns="" xmlns:p14="http://schemas.microsoft.com/office/powerpoint/2010/main" val="2923390044"/>
+              </p:ext>
+            </p:extLst>
+          </p:nvPr>
+        </p:nvGraphicFramePr>
+        <p:xfrm>
+          <a:off x="899592" y="1556792"/>
+          <a:ext cx="7267327" cy="4395936"/>
+        </p:xfrm>
+        <a:graphic>
+          <a:graphicData uri="http://schemas.openxmlformats.org/drawingml/2006/chart">
+            <c:chart xmlns:c="http://schemas.openxmlformats.org/drawingml/2006/chart" xmlns:r="http://schemas.openxmlformats.org/officeDocument/2006/relationships" r:id="rId2"/>
+          </a:graphicData>
+        </a:graphic>
+      </p:graphicFrame>
+      <p:sp>
+        <p:nvSpPr>
+          <p:cNvPr id="6" name="CaixaDeTexto 5"/>
+          <p:cNvSpPr txBox="1"/>
+          <p:nvPr/>
+        </p:nvSpPr>
+        <p:spPr>
+          <a:xfrm>
+            <a:off x="2987824" y="1628800"/>
+            <a:ext cx="1008112" cy="369332"/>
+          </a:xfrm>
+          <a:prstGeom prst="rect">
+            <a:avLst/>
+          </a:prstGeom>
+          <a:noFill/>
+        </p:spPr>
+        <p:txBody>
+          <a:bodyPr wrap="square" rtlCol="0">
+            <a:spAutoFit/>
+          </a:bodyPr>
+          <a:lstStyle/>
+          <a:p>
+            <a:r>
+              <a:rPr lang="pt-PT" dirty="0" smtClean="0"/>
+              <a:t>+ 3.5 %</a:t>
+            </a:r>
+            <a:endParaRPr lang="pt-PT" dirty="0"/>
+          </a:p>
+        </p:txBody>
+      </p:sp>
+    </p:spTree>
+  </p:cSld>
+  <p:clrMapOvr>
+    <a:masterClrMapping/>
+  </p:clrMapOvr>
+  <p:timing>
+    <p:tnLst>
+      <p:par>
+        <p:cTn id="1" dur="indefinite" restart="never" nodeType="tmRoot"/>
+      </p:par>
+    </p:tnLst>
+  </p:timing>
+</p:sld>
+</file>
+
+<file path=ppt/slides/slide23.xml><?xml version="1.0" encoding="utf-8"?>
+<p:sld xmlns:a="http://schemas.openxmlformats.org/drawingml/2006/main" xmlns:r="http://schemas.openxmlformats.org/officeDocument/2006/relationships" xmlns:p="http://schemas.openxmlformats.org/presentationml/2006/main">
+  <p:cSld>
+    <p:spTree>
+      <p:nvGrpSpPr>
+        <p:cNvPr id="1" name=""/>
+        <p:cNvGrpSpPr/>
+        <p:nvPr/>
+      </p:nvGrpSpPr>
+      <p:grpSpPr>
+        <a:xfrm>
+          <a:off x="0" y="0"/>
+          <a:ext cx="0" cy="0"/>
+          <a:chOff x="0" y="0"/>
+          <a:chExt cx="0" cy="0"/>
+        </a:xfrm>
+      </p:grpSpPr>
+      <p:sp>
+        <p:nvSpPr>
+          <p:cNvPr id="2" name="Título 1"/>
+          <p:cNvSpPr>
+            <a:spLocks noGrp="1"/>
+          </p:cNvSpPr>
+          <p:nvPr>
+            <p:ph type="title"/>
+          </p:nvPr>
+        </p:nvSpPr>
+        <p:spPr>
+          <a:xfrm>
+            <a:off x="457200" y="476672"/>
+            <a:ext cx="8229600" cy="1066800"/>
+          </a:xfrm>
+        </p:spPr>
+        <p:txBody>
+          <a:bodyPr/>
+          <a:lstStyle/>
+          <a:p>
+            <a:r>
+              <a:rPr lang="pt-PT" dirty="0" smtClean="0"/>
+              <a:t>Avaliação de desempenho (II)</a:t>
+            </a:r>
+            <a:endParaRPr lang="pt-PT" dirty="0"/>
+          </a:p>
+        </p:txBody>
+      </p:sp>
+      <p:sp>
+        <p:nvSpPr>
+          <p:cNvPr id="3" name="Marcador de Posição de Conteúdo 2"/>
+          <p:cNvSpPr>
+            <a:spLocks noGrp="1"/>
+          </p:cNvSpPr>
+          <p:nvPr>
+            <p:ph idx="1"/>
+          </p:nvPr>
+        </p:nvSpPr>
+        <p:spPr>
+          <a:xfrm>
+            <a:off x="467544" y="1412776"/>
+            <a:ext cx="8229600" cy="5157192"/>
+          </a:xfrm>
+        </p:spPr>
+        <p:txBody>
+          <a:bodyPr/>
+          <a:lstStyle/>
+          <a:p>
+            <a:r>
+              <a:rPr lang="pt-PT" dirty="0" smtClean="0"/>
+              <a:t>Avaliação da sobrecarga introduzida</a:t>
+            </a:r>
+          </a:p>
+          <a:p>
+            <a:pPr lvl="1"/>
+            <a:r>
+              <a:rPr lang="pt-PT" dirty="0" smtClean="0"/>
+              <a:t>Instrumentação com </a:t>
+            </a:r>
+            <a:r>
+              <a:rPr lang="pt-PT" dirty="0" err="1" smtClean="0"/>
+              <a:t>KProbe</a:t>
+            </a:r>
+            <a:r>
+              <a:rPr lang="pt-PT" dirty="0" smtClean="0"/>
+              <a:t> da chamada ao sistema </a:t>
+            </a:r>
+            <a:r>
+              <a:rPr lang="pt-PT" dirty="0" err="1" smtClean="0"/>
+              <a:t>getpid</a:t>
+            </a:r>
+            <a:endParaRPr lang="pt-PT" dirty="0" smtClean="0"/>
+          </a:p>
+          <a:p>
+            <a:pPr lvl="1">
+              <a:buNone/>
+            </a:pPr>
+            <a:r>
+              <a:rPr lang="pt-PT" dirty="0" smtClean="0"/>
+              <a:t>                           </a:t>
+            </a:r>
+            <a:r>
+              <a:rPr lang="pt-PT" sz="1400" dirty="0" smtClean="0"/>
+              <a:t>Tempos médios por chamada (</a:t>
+            </a:r>
+            <a:r>
+              <a:rPr lang="pt-PT" sz="1400" dirty="0" err="1" smtClean="0"/>
+              <a:t>micro-segundos</a:t>
+            </a:r>
+            <a:r>
+              <a:rPr lang="pt-PT" sz="1400" dirty="0" smtClean="0"/>
+              <a:t>)</a:t>
+            </a:r>
+            <a:endParaRPr lang="pt-PT" dirty="0" smtClean="0"/>
+          </a:p>
+          <a:p>
+            <a:pPr lvl="1"/>
+            <a:endParaRPr lang="pt-PT" dirty="0" smtClean="0"/>
+          </a:p>
+          <a:p>
+            <a:pPr lvl="1">
+              <a:buNone/>
+            </a:pPr>
+            <a:endParaRPr lang="en-US" dirty="0" smtClean="0"/>
+          </a:p>
+          <a:p>
+            <a:pPr lvl="1"/>
+            <a:endParaRPr lang="en-US" sz="1200" dirty="0" smtClean="0"/>
+          </a:p>
+          <a:p>
+            <a:pPr lvl="1"/>
+            <a:r>
+              <a:rPr lang="en-US" dirty="0" err="1" smtClean="0"/>
+              <a:t>Simulação</a:t>
+            </a:r>
+            <a:r>
+              <a:rPr lang="en-US" dirty="0" smtClean="0"/>
+              <a:t> d</a:t>
+            </a:r>
+            <a:r>
+              <a:rPr lang="pt-PT" dirty="0" smtClean="0"/>
+              <a:t>a criação e destruição de </a:t>
+            </a:r>
+            <a:r>
+              <a:rPr lang="pt-PT" dirty="0" err="1" smtClean="0"/>
+              <a:t>sockets</a:t>
+            </a:r>
+            <a:endParaRPr lang="pt-PT" dirty="0" smtClean="0"/>
+          </a:p>
+          <a:p>
+            <a:pPr lvl="1">
+              <a:buNone/>
+            </a:pPr>
+            <a:endParaRPr lang="pt-PT" dirty="0" smtClean="0"/>
+          </a:p>
+        </p:txBody>
+      </p:sp>
+      <p:sp>
+        <p:nvSpPr>
+          <p:cNvPr id="5" name="Marcador de Posição do Número do Diapositivo 4"/>
+          <p:cNvSpPr>
+            <a:spLocks noGrp="1"/>
+          </p:cNvSpPr>
+          <p:nvPr>
+            <p:ph type="sldNum" sz="quarter" idx="12"/>
+          </p:nvPr>
+        </p:nvSpPr>
+        <p:spPr/>
+        <p:txBody>
+          <a:bodyPr/>
+          <a:lstStyle/>
+          <a:p>
+            <a:fld id="{AC560869-1695-4081-8E6F-05D0DB8947D3}" type="slidenum">
+              <a:rPr lang="pt-PT" smtClean="0"/>
+              <a:pPr/>
+              <a:t>23</a:t>
             </a:fld>
             <a:endParaRPr lang="pt-PT"/>
           </a:p>
@@ -13399,7 +13843,7 @@
 </p:sld>
 </file>
 
-<file path=ppt/slides/slide21.xml><?xml version="1.0" encoding="utf-8"?>
+<file path=ppt/slides/slide24.xml><?xml version="1.0" encoding="utf-8"?>
 <p:sld xmlns:a="http://schemas.openxmlformats.org/drawingml/2006/main" xmlns:r="http://schemas.openxmlformats.org/officeDocument/2006/relationships" xmlns:p="http://schemas.openxmlformats.org/presentationml/2006/main">
   <p:cSld>
     <p:spTree>
@@ -13428,21 +13872,109 @@
         </p:nvSpPr>
         <p:spPr>
           <a:xfrm>
-            <a:off x="35496" y="404664"/>
+            <a:off x="457200" y="692696"/>
             <a:ext cx="8229600" cy="1066800"/>
           </a:xfrm>
         </p:spPr>
         <p:txBody>
+          <a:bodyPr/>
+          <a:lstStyle/>
+          <a:p>
+            <a:r>
+              <a:rPr lang="pt-PT" dirty="0" smtClean="0"/>
+              <a:t>Conclusões</a:t>
+            </a:r>
+            <a:endParaRPr lang="pt-PT" dirty="0"/>
+          </a:p>
+        </p:txBody>
+      </p:sp>
+      <p:sp>
+        <p:nvSpPr>
+          <p:cNvPr id="3" name="Marcador de Posição de Conteúdo 2"/>
+          <p:cNvSpPr>
+            <a:spLocks noGrp="1"/>
+          </p:cNvSpPr>
+          <p:nvPr>
+            <p:ph idx="1"/>
+          </p:nvPr>
+        </p:nvSpPr>
+        <p:spPr>
+          <a:xfrm>
+            <a:off x="457200" y="1772816"/>
+            <a:ext cx="8229600" cy="4801720"/>
+          </a:xfrm>
+        </p:spPr>
+        <p:txBody>
           <a:bodyPr>
-            <a:normAutofit/>
+            <a:normAutofit fontScale="92500"/>
           </a:bodyPr>
           <a:lstStyle/>
           <a:p>
             <a:r>
-              <a:rPr lang="pt-PT" smtClean="0"/>
-              <a:t>Avaliação de desempenho (III)</a:t>
-            </a:r>
-            <a:endParaRPr lang="pt-PT"/>
+              <a:rPr lang="pt-PT" dirty="0" smtClean="0"/>
+              <a:t>Implementado módulo de </a:t>
+            </a:r>
+            <a:r>
+              <a:rPr lang="pt-PT" dirty="0"/>
+              <a:t>extensão ao </a:t>
+            </a:r>
+            <a:r>
+              <a:rPr lang="pt-PT" dirty="0" smtClean="0"/>
+              <a:t>LSF/P</a:t>
+            </a:r>
+            <a:r>
+              <a:rPr lang="en-US" dirty="0" smtClean="0"/>
+              <a:t>C</a:t>
+            </a:r>
+            <a:r>
+              <a:rPr lang="pt-PT" dirty="0" err="1" smtClean="0"/>
+              <a:t>ap</a:t>
+            </a:r>
+            <a:r>
+              <a:rPr lang="pt-PT" dirty="0" smtClean="0"/>
+              <a:t> para filtragem orientada ao processo(s)</a:t>
+            </a:r>
+            <a:endParaRPr lang="pt-PT" dirty="0"/>
+          </a:p>
+          <a:p>
+            <a:r>
+              <a:rPr lang="pt-PT" dirty="0" smtClean="0"/>
+              <a:t>Obtém durante a execução apenas a informação relevante</a:t>
+            </a:r>
+          </a:p>
+          <a:p>
+            <a:r>
+              <a:rPr lang="pt-PT" dirty="0" smtClean="0"/>
+              <a:t>Mantida a compatibilidade com os filtros existentes</a:t>
+            </a:r>
+            <a:endParaRPr lang="pt-PT" dirty="0"/>
+          </a:p>
+          <a:p>
+            <a:r>
+              <a:rPr lang="pt-PT" dirty="0" smtClean="0"/>
+              <a:t>Sobrecarga mínima e permite melhores resultados que a captura original noutros casos</a:t>
+            </a:r>
+          </a:p>
+          <a:p>
+            <a:pPr lvl="1"/>
+            <a:r>
+              <a:rPr lang="pt-PT" dirty="0" smtClean="0"/>
+              <a:t>Apenas captura um subconjunto do tráfego de rede</a:t>
+            </a:r>
+            <a:endParaRPr lang="pt-PT" dirty="0"/>
+          </a:p>
+          <a:p>
+            <a:r>
+              <a:rPr lang="pt-PT" dirty="0" smtClean="0"/>
+              <a:t>Trabalho futuro:</a:t>
+            </a:r>
+          </a:p>
+          <a:p>
+            <a:pPr lvl="1"/>
+            <a:r>
+              <a:rPr lang="pt-PT" dirty="0" smtClean="0"/>
+              <a:t>Disponibilização e testes para a comunidade</a:t>
+            </a:r>
           </a:p>
         </p:txBody>
       </p:sp>
@@ -13464,30 +13996,12 @@
             <a:fld id="{AC560869-1695-4081-8E6F-05D0DB8947D3}" type="slidenum">
               <a:rPr lang="pt-PT" smtClean="0"/>
               <a:pPr/>
-              <a:t>21</a:t>
+              <a:t>24</a:t>
             </a:fld>
             <a:endParaRPr lang="pt-PT"/>
           </a:p>
         </p:txBody>
       </p:sp>
-      <p:graphicFrame>
-        <p:nvGraphicFramePr>
-          <p:cNvPr id="6" name="Gráfico 5"/>
-          <p:cNvGraphicFramePr>
-            <a:graphicFrameLocks/>
-          </p:cNvGraphicFramePr>
-          <p:nvPr/>
-        </p:nvGraphicFramePr>
-        <p:xfrm>
-          <a:off x="251520" y="2420888"/>
-          <a:ext cx="8496944" cy="4057650"/>
-        </p:xfrm>
-        <a:graphic>
-          <a:graphicData uri="http://schemas.openxmlformats.org/drawingml/2006/chart">
-            <c:chart xmlns:c="http://schemas.openxmlformats.org/drawingml/2006/chart" xmlns:r="http://schemas.openxmlformats.org/officeDocument/2006/relationships" r:id="rId2"/>
-          </a:graphicData>
-        </a:graphic>
-      </p:graphicFrame>
     </p:spTree>
   </p:cSld>
   <p:clrMapOvr>
@@ -13503,321 +14017,7 @@
 </p:sld>
 </file>
 
-<file path=ppt/slides/slide22.xml><?xml version="1.0" encoding="utf-8"?>
-<p:sld xmlns:a="http://schemas.openxmlformats.org/drawingml/2006/main" xmlns:r="http://schemas.openxmlformats.org/officeDocument/2006/relationships" xmlns:p="http://schemas.openxmlformats.org/presentationml/2006/main">
-  <p:cSld>
-    <p:spTree>
-      <p:nvGrpSpPr>
-        <p:cNvPr id="1" name=""/>
-        <p:cNvGrpSpPr/>
-        <p:nvPr/>
-      </p:nvGrpSpPr>
-      <p:grpSpPr>
-        <a:xfrm>
-          <a:off x="0" y="0"/>
-          <a:ext cx="0" cy="0"/>
-          <a:chOff x="0" y="0"/>
-          <a:chExt cx="0" cy="0"/>
-        </a:xfrm>
-      </p:grpSpPr>
-      <p:sp>
-        <p:nvSpPr>
-          <p:cNvPr id="2" name="Título 1"/>
-          <p:cNvSpPr>
-            <a:spLocks noGrp="1"/>
-          </p:cNvSpPr>
-          <p:nvPr>
-            <p:ph type="title"/>
-          </p:nvPr>
-        </p:nvSpPr>
-        <p:spPr>
-          <a:xfrm>
-            <a:off x="35496" y="404664"/>
-            <a:ext cx="8229600" cy="1066800"/>
-          </a:xfrm>
-        </p:spPr>
-        <p:txBody>
-          <a:bodyPr>
-            <a:normAutofit/>
-          </a:bodyPr>
-          <a:lstStyle/>
-          <a:p>
-            <a:r>
-              <a:rPr lang="pt-PT" smtClean="0"/>
-              <a:t>Avaliação de desempenho (IV)</a:t>
-            </a:r>
-            <a:endParaRPr lang="pt-PT"/>
-          </a:p>
-        </p:txBody>
-      </p:sp>
-      <p:sp>
-        <p:nvSpPr>
-          <p:cNvPr id="5" name="Marcador de Posição do Número do Diapositivo 4"/>
-          <p:cNvSpPr>
-            <a:spLocks noGrp="1"/>
-          </p:cNvSpPr>
-          <p:nvPr>
-            <p:ph type="sldNum" sz="quarter" idx="12"/>
-          </p:nvPr>
-        </p:nvSpPr>
-        <p:spPr/>
-        <p:txBody>
-          <a:bodyPr/>
-          <a:lstStyle/>
-          <a:p>
-            <a:fld id="{AC560869-1695-4081-8E6F-05D0DB8947D3}" type="slidenum">
-              <a:rPr lang="pt-PT" smtClean="0"/>
-              <a:pPr/>
-              <a:t>22</a:t>
-            </a:fld>
-            <a:endParaRPr lang="pt-PT"/>
-          </a:p>
-        </p:txBody>
-      </p:sp>
-      <p:graphicFrame>
-        <p:nvGraphicFramePr>
-          <p:cNvPr id="7" name="Gráfico 6"/>
-          <p:cNvGraphicFramePr>
-            <a:graphicFrameLocks/>
-          </p:cNvGraphicFramePr>
-          <p:nvPr>
-            <p:extLst>
-              <p:ext uri="{D42A27DB-BD31-4B8C-83A1-F6EECF244321}">
-                <p14:modId xmlns="" xmlns:p14="http://schemas.microsoft.com/office/powerpoint/2010/main" val="2923390044"/>
-              </p:ext>
-            </p:extLst>
-          </p:nvPr>
-        </p:nvGraphicFramePr>
-        <p:xfrm>
-          <a:off x="899592" y="1556792"/>
-          <a:ext cx="7267327" cy="4395936"/>
-        </p:xfrm>
-        <a:graphic>
-          <a:graphicData uri="http://schemas.openxmlformats.org/drawingml/2006/chart">
-            <c:chart xmlns:c="http://schemas.openxmlformats.org/drawingml/2006/chart" xmlns:r="http://schemas.openxmlformats.org/officeDocument/2006/relationships" r:id="rId2"/>
-          </a:graphicData>
-        </a:graphic>
-      </p:graphicFrame>
-      <p:sp>
-        <p:nvSpPr>
-          <p:cNvPr id="6" name="CaixaDeTexto 5"/>
-          <p:cNvSpPr txBox="1"/>
-          <p:nvPr/>
-        </p:nvSpPr>
-        <p:spPr>
-          <a:xfrm>
-            <a:off x="2987824" y="1628800"/>
-            <a:ext cx="1008112" cy="369332"/>
-          </a:xfrm>
-          <a:prstGeom prst="rect">
-            <a:avLst/>
-          </a:prstGeom>
-          <a:noFill/>
-        </p:spPr>
-        <p:txBody>
-          <a:bodyPr wrap="square" rtlCol="0">
-            <a:spAutoFit/>
-          </a:bodyPr>
-          <a:lstStyle/>
-          <a:p>
-            <a:r>
-              <a:rPr lang="pt-PT" dirty="0" smtClean="0"/>
-              <a:t>+ 3.5 %</a:t>
-            </a:r>
-            <a:endParaRPr lang="pt-PT" dirty="0"/>
-          </a:p>
-        </p:txBody>
-      </p:sp>
-    </p:spTree>
-  </p:cSld>
-  <p:clrMapOvr>
-    <a:masterClrMapping/>
-  </p:clrMapOvr>
-  <p:timing>
-    <p:tnLst>
-      <p:par>
-        <p:cTn id="1" dur="indefinite" restart="never" nodeType="tmRoot"/>
-      </p:par>
-    </p:tnLst>
-  </p:timing>
-</p:sld>
-</file>
-
-<file path=ppt/slides/slide23.xml><?xml version="1.0" encoding="utf-8"?>
-<p:sld xmlns:a="http://schemas.openxmlformats.org/drawingml/2006/main" xmlns:r="http://schemas.openxmlformats.org/officeDocument/2006/relationships" xmlns:p="http://schemas.openxmlformats.org/presentationml/2006/main">
-  <p:cSld>
-    <p:spTree>
-      <p:nvGrpSpPr>
-        <p:cNvPr id="1" name=""/>
-        <p:cNvGrpSpPr/>
-        <p:nvPr/>
-      </p:nvGrpSpPr>
-      <p:grpSpPr>
-        <a:xfrm>
-          <a:off x="0" y="0"/>
-          <a:ext cx="0" cy="0"/>
-          <a:chOff x="0" y="0"/>
-          <a:chExt cx="0" cy="0"/>
-        </a:xfrm>
-      </p:grpSpPr>
-      <p:sp>
-        <p:nvSpPr>
-          <p:cNvPr id="2" name="Título 1"/>
-          <p:cNvSpPr>
-            <a:spLocks noGrp="1"/>
-          </p:cNvSpPr>
-          <p:nvPr>
-            <p:ph type="title"/>
-          </p:nvPr>
-        </p:nvSpPr>
-        <p:spPr>
-          <a:xfrm>
-            <a:off x="457200" y="692696"/>
-            <a:ext cx="8229600" cy="1066800"/>
-          </a:xfrm>
-        </p:spPr>
-        <p:txBody>
-          <a:bodyPr/>
-          <a:lstStyle/>
-          <a:p>
-            <a:r>
-              <a:rPr lang="pt-PT" dirty="0" smtClean="0"/>
-              <a:t>Conclusões</a:t>
-            </a:r>
-            <a:endParaRPr lang="pt-PT" dirty="0"/>
-          </a:p>
-        </p:txBody>
-      </p:sp>
-      <p:sp>
-        <p:nvSpPr>
-          <p:cNvPr id="3" name="Marcador de Posição de Conteúdo 2"/>
-          <p:cNvSpPr>
-            <a:spLocks noGrp="1"/>
-          </p:cNvSpPr>
-          <p:nvPr>
-            <p:ph idx="1"/>
-          </p:nvPr>
-        </p:nvSpPr>
-        <p:spPr>
-          <a:xfrm>
-            <a:off x="457200" y="1772816"/>
-            <a:ext cx="8229600" cy="4801720"/>
-          </a:xfrm>
-        </p:spPr>
-        <p:txBody>
-          <a:bodyPr>
-            <a:normAutofit fontScale="92500"/>
-          </a:bodyPr>
-          <a:lstStyle/>
-          <a:p>
-            <a:r>
-              <a:rPr lang="pt-PT" dirty="0" smtClean="0"/>
-              <a:t>Implementado módulo de </a:t>
-            </a:r>
-            <a:r>
-              <a:rPr lang="pt-PT" dirty="0"/>
-              <a:t>extensão ao </a:t>
-            </a:r>
-            <a:r>
-              <a:rPr lang="pt-PT" dirty="0" smtClean="0"/>
-              <a:t>LSF/P</a:t>
-            </a:r>
-            <a:r>
-              <a:rPr lang="en-US" dirty="0" smtClean="0"/>
-              <a:t>C</a:t>
-            </a:r>
-            <a:r>
-              <a:rPr lang="pt-PT" dirty="0" err="1" smtClean="0"/>
-              <a:t>ap</a:t>
-            </a:r>
-            <a:r>
-              <a:rPr lang="pt-PT" dirty="0" smtClean="0"/>
-              <a:t> para filtragem orientada ao processo(s)</a:t>
-            </a:r>
-            <a:endParaRPr lang="pt-PT" dirty="0"/>
-          </a:p>
-          <a:p>
-            <a:r>
-              <a:rPr lang="pt-PT" dirty="0" smtClean="0"/>
-              <a:t>Obtém durante a execução apenas a informação relevante</a:t>
-            </a:r>
-          </a:p>
-          <a:p>
-            <a:r>
-              <a:rPr lang="pt-PT" dirty="0" smtClean="0"/>
-              <a:t>Mantida a compatibilidade com os filtros existentes</a:t>
-            </a:r>
-            <a:endParaRPr lang="pt-PT" dirty="0"/>
-          </a:p>
-          <a:p>
-            <a:r>
-              <a:rPr lang="pt-PT" dirty="0" smtClean="0"/>
-              <a:t>Sobrecarga mínima e permite melhores resultados que a captura original noutros casos</a:t>
-            </a:r>
-          </a:p>
-          <a:p>
-            <a:pPr lvl="1"/>
-            <a:r>
-              <a:rPr lang="pt-PT" dirty="0" smtClean="0"/>
-              <a:t>Apenas captura um subconjunto do tráfego de rede</a:t>
-            </a:r>
-            <a:endParaRPr lang="pt-PT" dirty="0"/>
-          </a:p>
-          <a:p>
-            <a:r>
-              <a:rPr lang="pt-PT" dirty="0" smtClean="0"/>
-              <a:t>Trabalho futuro:</a:t>
-            </a:r>
-          </a:p>
-          <a:p>
-            <a:pPr lvl="1"/>
-            <a:r>
-              <a:rPr lang="pt-PT" dirty="0" smtClean="0"/>
-              <a:t>Disponibilização e testes para a comunidade</a:t>
-            </a:r>
-          </a:p>
-        </p:txBody>
-      </p:sp>
-      <p:sp>
-        <p:nvSpPr>
-          <p:cNvPr id="5" name="Marcador de Posição do Número do Diapositivo 4"/>
-          <p:cNvSpPr>
-            <a:spLocks noGrp="1"/>
-          </p:cNvSpPr>
-          <p:nvPr>
-            <p:ph type="sldNum" sz="quarter" idx="12"/>
-          </p:nvPr>
-        </p:nvSpPr>
-        <p:spPr/>
-        <p:txBody>
-          <a:bodyPr/>
-          <a:lstStyle/>
-          <a:p>
-            <a:fld id="{AC560869-1695-4081-8E6F-05D0DB8947D3}" type="slidenum">
-              <a:rPr lang="pt-PT" smtClean="0"/>
-              <a:pPr/>
-              <a:t>23</a:t>
-            </a:fld>
-            <a:endParaRPr lang="pt-PT"/>
-          </a:p>
-        </p:txBody>
-      </p:sp>
-    </p:spTree>
-  </p:cSld>
-  <p:clrMapOvr>
-    <a:masterClrMapping/>
-  </p:clrMapOvr>
-  <p:timing>
-    <p:tnLst>
-      <p:par>
-        <p:cTn id="1" dur="indefinite" restart="never" nodeType="tmRoot"/>
-      </p:par>
-    </p:tnLst>
-  </p:timing>
-</p:sld>
-</file>
-
-<file path=ppt/slides/slide24.xml><?xml version="1.0" encoding="utf-8"?>
+<file path=ppt/slides/slide25.xml><?xml version="1.0" encoding="utf-8"?>
 <p:sld xmlns:a="http://schemas.openxmlformats.org/drawingml/2006/main" xmlns:r="http://schemas.openxmlformats.org/officeDocument/2006/relationships" xmlns:p="http://schemas.openxmlformats.org/presentationml/2006/main">
   <p:cSld>
     <p:spTree>
@@ -13931,7 +14131,7 @@
             <a:fld id="{AC560869-1695-4081-8E6F-05D0DB8947D3}" type="slidenum">
               <a:rPr lang="pt-PT" smtClean="0"/>
               <a:pPr/>
-              <a:t>24</a:t>
+              <a:t>25</a:t>
             </a:fld>
             <a:endParaRPr lang="pt-PT"/>
           </a:p>
@@ -14026,7 +14226,7 @@
 </p:sld>
 </file>
 
-<file path=ppt/slides/slide25.xml><?xml version="1.0" encoding="utf-8"?>
+<file path=ppt/slides/slide26.xml><?xml version="1.0" encoding="utf-8"?>
 <p:sld xmlns:a="http://schemas.openxmlformats.org/drawingml/2006/main" xmlns:r="http://schemas.openxmlformats.org/officeDocument/2006/relationships" xmlns:p="http://schemas.openxmlformats.org/presentationml/2006/main">
   <p:cSld>
     <p:spTree>
@@ -15450,7 +15650,7 @@
             <a:fld id="{AC560869-1695-4081-8E6F-05D0DB8947D3}" type="slidenum">
               <a:rPr lang="pt-PT" smtClean="0"/>
               <a:pPr/>
-              <a:t>25</a:t>
+              <a:t>26</a:t>
             </a:fld>
             <a:endParaRPr lang="pt-PT"/>
           </a:p>
@@ -16500,7 +16700,7 @@
 </p:sld>
 </file>
 
-<file path=ppt/slides/slide26.xml><?xml version="1.0" encoding="utf-8"?>
+<file path=ppt/slides/slide27.xml><?xml version="1.0" encoding="utf-8"?>
 <p:sld xmlns:a="http://schemas.openxmlformats.org/drawingml/2006/main" xmlns:r="http://schemas.openxmlformats.org/officeDocument/2006/relationships" xmlns:p="http://schemas.openxmlformats.org/presentationml/2006/main">
   <p:cSld>
     <p:spTree>
@@ -16615,7 +16815,7 @@
             <a:fld id="{AC560869-1695-4081-8E6F-05D0DB8947D3}" type="slidenum">
               <a:rPr lang="pt-PT" smtClean="0"/>
               <a:pPr/>
-              <a:t>26</a:t>
+              <a:t>27</a:t>
             </a:fld>
             <a:endParaRPr lang="pt-PT"/>
           </a:p>
@@ -16641,7 +16841,7 @@
 </p:sld>
 </file>
 
-<file path=ppt/slides/slide27.xml><?xml version="1.0" encoding="utf-8"?>
+<file path=ppt/slides/slide28.xml><?xml version="1.0" encoding="utf-8"?>
 <p:sld xmlns:a="http://schemas.openxmlformats.org/drawingml/2006/main" xmlns:r="http://schemas.openxmlformats.org/officeDocument/2006/relationships" xmlns:p="http://schemas.openxmlformats.org/presentationml/2006/main">
   <p:cSld>
     <p:spTree>
@@ -16706,7 +16906,7 @@
             <a:fld id="{AC560869-1695-4081-8E6F-05D0DB8947D3}" type="slidenum">
               <a:rPr lang="pt-PT" smtClean="0"/>
               <a:pPr/>
-              <a:t>27</a:t>
+              <a:t>28</a:t>
             </a:fld>
             <a:endParaRPr lang="pt-PT"/>
           </a:p>
@@ -16775,7 +16975,7 @@
 </p:sld>
 </file>
 
-<file path=ppt/slides/slide28.xml><?xml version="1.0" encoding="utf-8"?>
+<file path=ppt/slides/slide29.xml><?xml version="1.0" encoding="utf-8"?>
 <p:sld xmlns:a="http://schemas.openxmlformats.org/drawingml/2006/main" xmlns:r="http://schemas.openxmlformats.org/officeDocument/2006/relationships" xmlns:p="http://schemas.openxmlformats.org/presentationml/2006/main">
   <p:cSld>
     <p:spTree>
@@ -17313,7 +17513,7 @@
             <a:fld id="{AC560869-1695-4081-8E6F-05D0DB8947D3}" type="slidenum">
               <a:rPr lang="pt-PT" smtClean="0"/>
               <a:pPr/>
-              <a:t>28</a:t>
+              <a:t>29</a:t>
             </a:fld>
             <a:endParaRPr lang="pt-PT"/>
           </a:p>
@@ -18013,198 +18213,6 @@
 </p:sld>
 </file>
 
-<file path=ppt/slides/slide29.xml><?xml version="1.0" encoding="utf-8"?>
-<p:sld xmlns:a="http://schemas.openxmlformats.org/drawingml/2006/main" xmlns:r="http://schemas.openxmlformats.org/officeDocument/2006/relationships" xmlns:p="http://schemas.openxmlformats.org/presentationml/2006/main">
-  <p:cSld>
-    <p:spTree>
-      <p:nvGrpSpPr>
-        <p:cNvPr id="1" name=""/>
-        <p:cNvGrpSpPr/>
-        <p:nvPr/>
-      </p:nvGrpSpPr>
-      <p:grpSpPr>
-        <a:xfrm>
-          <a:off x="0" y="0"/>
-          <a:ext cx="0" cy="0"/>
-          <a:chOff x="0" y="0"/>
-          <a:chExt cx="0" cy="0"/>
-        </a:xfrm>
-      </p:grpSpPr>
-      <p:sp>
-        <p:nvSpPr>
-          <p:cNvPr id="2" name="Título 1"/>
-          <p:cNvSpPr>
-            <a:spLocks noGrp="1"/>
-          </p:cNvSpPr>
-          <p:nvPr>
-            <p:ph type="title"/>
-          </p:nvPr>
-        </p:nvSpPr>
-        <p:spPr>
-          <a:xfrm>
-            <a:off x="467544" y="634008"/>
-            <a:ext cx="8229600" cy="1066800"/>
-          </a:xfrm>
-        </p:spPr>
-        <p:txBody>
-          <a:bodyPr>
-            <a:normAutofit/>
-          </a:bodyPr>
-          <a:lstStyle/>
-          <a:p>
-            <a:r>
-              <a:rPr lang="pt-PT" dirty="0" smtClean="0"/>
-              <a:t> Monitorização </a:t>
-            </a:r>
-            <a:endParaRPr lang="pt-PT" dirty="0"/>
-          </a:p>
-        </p:txBody>
-      </p:sp>
-      <p:sp>
-        <p:nvSpPr>
-          <p:cNvPr id="3" name="Marcador de Posição de Conteúdo 2"/>
-          <p:cNvSpPr>
-            <a:spLocks noGrp="1"/>
-          </p:cNvSpPr>
-          <p:nvPr>
-            <p:ph idx="1"/>
-          </p:nvPr>
-        </p:nvSpPr>
-        <p:spPr>
-          <a:xfrm>
-            <a:off x="179512" y="1840192"/>
-            <a:ext cx="8784976" cy="4325112"/>
-          </a:xfrm>
-        </p:spPr>
-        <p:txBody>
-          <a:bodyPr>
-            <a:normAutofit lnSpcReduction="10000"/>
-          </a:bodyPr>
-          <a:lstStyle/>
-          <a:p>
-            <a:r>
-              <a:rPr lang="pt-PT" dirty="0" smtClean="0"/>
-              <a:t>Abordagens (para as interacções de um processo)</a:t>
-            </a:r>
-          </a:p>
-          <a:p>
-            <a:pPr lvl="1"/>
-            <a:r>
-              <a:rPr lang="pt-PT" dirty="0"/>
-              <a:t>N</a:t>
-            </a:r>
-            <a:r>
-              <a:rPr lang="pt-PT" dirty="0" smtClean="0"/>
-              <a:t>ível utilizador (1)</a:t>
-            </a:r>
-          </a:p>
-          <a:p>
-            <a:pPr lvl="2"/>
-            <a:r>
-              <a:rPr lang="pt-PT" dirty="0" smtClean="0"/>
-              <a:t>Instrumentação do programa ou bibliotecas para obter a informação relevante</a:t>
-            </a:r>
-          </a:p>
-          <a:p>
-            <a:pPr lvl="2"/>
-            <a:endParaRPr lang="pt-PT" dirty="0" smtClean="0"/>
-          </a:p>
-          <a:p>
-            <a:pPr lvl="1"/>
-            <a:r>
-              <a:rPr lang="pt-PT" dirty="0" smtClean="0"/>
-              <a:t>Com auxílio do núcleo do sistema (2)</a:t>
-            </a:r>
-          </a:p>
-          <a:p>
-            <a:pPr lvl="2"/>
-            <a:r>
-              <a:rPr lang="pt-PT" dirty="0" smtClean="0"/>
-              <a:t>exemplo</a:t>
-            </a:r>
-            <a:r>
-              <a:rPr lang="en-US" dirty="0" smtClean="0"/>
-              <a:t>: </a:t>
-            </a:r>
-            <a:r>
-              <a:rPr lang="pt-PT" dirty="0" smtClean="0"/>
-              <a:t>captura de pacotes através da biblioteca </a:t>
-            </a:r>
-            <a:r>
-              <a:rPr lang="pt-PT" i="1" dirty="0" err="1" smtClean="0"/>
-              <a:t>PCap</a:t>
-            </a:r>
-            <a:r>
-              <a:rPr lang="pt-PT" dirty="0" smtClean="0"/>
-              <a:t> </a:t>
-            </a:r>
-            <a:endParaRPr lang="pt-PT" dirty="0"/>
-          </a:p>
-          <a:p>
-            <a:pPr lvl="2"/>
-            <a:r>
-              <a:rPr lang="pt-PT" dirty="0" smtClean="0"/>
-              <a:t>monitorização do processo para obter as alterações nas interacções via rede</a:t>
-            </a:r>
-          </a:p>
-          <a:p>
-            <a:pPr lvl="2"/>
-            <a:r>
-              <a:rPr lang="pt-PT" dirty="0" smtClean="0"/>
-              <a:t>filtrar a informação relevante</a:t>
-            </a:r>
-          </a:p>
-          <a:p>
-            <a:pPr lvl="8">
-              <a:buNone/>
-            </a:pPr>
-            <a:r>
-              <a:rPr lang="pt-PT" dirty="0" smtClean="0"/>
-              <a:t>		</a:t>
-            </a:r>
-            <a:endParaRPr lang="pt-PT" dirty="0"/>
-          </a:p>
-        </p:txBody>
-      </p:sp>
-      <p:sp>
-        <p:nvSpPr>
-          <p:cNvPr id="4" name="Marcador de Posição do Número do Diapositivo 3"/>
-          <p:cNvSpPr>
-            <a:spLocks noGrp="1"/>
-          </p:cNvSpPr>
-          <p:nvPr>
-            <p:ph type="sldNum" sz="quarter" idx="12"/>
-          </p:nvPr>
-        </p:nvSpPr>
-        <p:spPr/>
-        <p:txBody>
-          <a:bodyPr/>
-          <a:lstStyle/>
-          <a:p>
-            <a:fld id="{AC560869-1695-4081-8E6F-05D0DB8947D3}" type="slidenum">
-              <a:rPr lang="pt-PT" smtClean="0"/>
-              <a:pPr/>
-              <a:t>29</a:t>
-            </a:fld>
-            <a:endParaRPr lang="pt-PT"/>
-          </a:p>
-        </p:txBody>
-      </p:sp>
-    </p:spTree>
-  </p:cSld>
-  <p:clrMapOvr>
-    <a:masterClrMapping/>
-  </p:clrMapOvr>
-  <p:timing>
-    <p:tnLst>
-      <p:par>
-        <p:cTn id="1" dur="indefinite" restart="never" nodeType="tmRoot"/>
-      </p:par>
-    </p:tnLst>
-  </p:timing>
-</p:sld>
-</file>
-
 <file path=ppt/slides/slide3.xml><?xml version="1.0" encoding="utf-8"?>
 <p:sld xmlns:a="http://schemas.openxmlformats.org/drawingml/2006/main" xmlns:r="http://schemas.openxmlformats.org/officeDocument/2006/relationships" xmlns:p="http://schemas.openxmlformats.org/presentationml/2006/main">
   <p:cSld>
@@ -18376,17 +18384,19 @@
         </p:nvSpPr>
         <p:spPr>
           <a:xfrm>
-            <a:off x="457200" y="404664"/>
+            <a:off x="467544" y="634008"/>
             <a:ext cx="8229600" cy="1066800"/>
           </a:xfrm>
         </p:spPr>
         <p:txBody>
-          <a:bodyPr/>
+          <a:bodyPr>
+            <a:normAutofit/>
+          </a:bodyPr>
           <a:lstStyle/>
           <a:p>
             <a:r>
               <a:rPr lang="pt-PT" dirty="0" smtClean="0"/>
-              <a:t>Monitorização de rede</a:t>
+              <a:t> Monitorização </a:t>
             </a:r>
             <a:endParaRPr lang="pt-PT" dirty="0"/>
           </a:p>
@@ -18404,6 +18414,196 @@
         </p:nvSpPr>
         <p:spPr>
           <a:xfrm>
+            <a:off x="179512" y="1840192"/>
+            <a:ext cx="8784976" cy="4325112"/>
+          </a:xfrm>
+        </p:spPr>
+        <p:txBody>
+          <a:bodyPr>
+            <a:normAutofit lnSpcReduction="10000"/>
+          </a:bodyPr>
+          <a:lstStyle/>
+          <a:p>
+            <a:r>
+              <a:rPr lang="pt-PT" dirty="0" smtClean="0"/>
+              <a:t>Abordagens (para as interacções de um processo)</a:t>
+            </a:r>
+          </a:p>
+          <a:p>
+            <a:pPr lvl="1"/>
+            <a:r>
+              <a:rPr lang="pt-PT" dirty="0"/>
+              <a:t>N</a:t>
+            </a:r>
+            <a:r>
+              <a:rPr lang="pt-PT" dirty="0" smtClean="0"/>
+              <a:t>ível utilizador (1)</a:t>
+            </a:r>
+          </a:p>
+          <a:p>
+            <a:pPr lvl="2"/>
+            <a:r>
+              <a:rPr lang="pt-PT" dirty="0" smtClean="0"/>
+              <a:t>Instrumentação do programa ou bibliotecas para obter a informação relevante</a:t>
+            </a:r>
+          </a:p>
+          <a:p>
+            <a:pPr lvl="2"/>
+            <a:endParaRPr lang="pt-PT" dirty="0" smtClean="0"/>
+          </a:p>
+          <a:p>
+            <a:pPr lvl="1"/>
+            <a:r>
+              <a:rPr lang="pt-PT" dirty="0" smtClean="0"/>
+              <a:t>Com auxílio do núcleo do sistema (2)</a:t>
+            </a:r>
+          </a:p>
+          <a:p>
+            <a:pPr lvl="2"/>
+            <a:r>
+              <a:rPr lang="pt-PT" dirty="0" smtClean="0"/>
+              <a:t>exemplo</a:t>
+            </a:r>
+            <a:r>
+              <a:rPr lang="en-US" dirty="0" smtClean="0"/>
+              <a:t>: </a:t>
+            </a:r>
+            <a:r>
+              <a:rPr lang="pt-PT" dirty="0" smtClean="0"/>
+              <a:t>captura de pacotes através da biblioteca </a:t>
+            </a:r>
+            <a:r>
+              <a:rPr lang="pt-PT" i="1" dirty="0" err="1" smtClean="0"/>
+              <a:t>PCap</a:t>
+            </a:r>
+            <a:r>
+              <a:rPr lang="pt-PT" dirty="0" smtClean="0"/>
+              <a:t> </a:t>
+            </a:r>
+            <a:endParaRPr lang="pt-PT" dirty="0"/>
+          </a:p>
+          <a:p>
+            <a:pPr lvl="2"/>
+            <a:r>
+              <a:rPr lang="pt-PT" dirty="0" smtClean="0"/>
+              <a:t>monitorização do processo para obter as alterações nas interacções via rede</a:t>
+            </a:r>
+          </a:p>
+          <a:p>
+            <a:pPr lvl="2"/>
+            <a:r>
+              <a:rPr lang="pt-PT" dirty="0" smtClean="0"/>
+              <a:t>filtrar a informação relevante</a:t>
+            </a:r>
+          </a:p>
+          <a:p>
+            <a:pPr lvl="8">
+              <a:buNone/>
+            </a:pPr>
+            <a:r>
+              <a:rPr lang="pt-PT" dirty="0" smtClean="0"/>
+              <a:t>		</a:t>
+            </a:r>
+            <a:endParaRPr lang="pt-PT" dirty="0"/>
+          </a:p>
+        </p:txBody>
+      </p:sp>
+      <p:sp>
+        <p:nvSpPr>
+          <p:cNvPr id="4" name="Marcador de Posição do Número do Diapositivo 3"/>
+          <p:cNvSpPr>
+            <a:spLocks noGrp="1"/>
+          </p:cNvSpPr>
+          <p:nvPr>
+            <p:ph type="sldNum" sz="quarter" idx="12"/>
+          </p:nvPr>
+        </p:nvSpPr>
+        <p:spPr/>
+        <p:txBody>
+          <a:bodyPr/>
+          <a:lstStyle/>
+          <a:p>
+            <a:fld id="{AC560869-1695-4081-8E6F-05D0DB8947D3}" type="slidenum">
+              <a:rPr lang="pt-PT" smtClean="0"/>
+              <a:pPr/>
+              <a:t>30</a:t>
+            </a:fld>
+            <a:endParaRPr lang="pt-PT"/>
+          </a:p>
+        </p:txBody>
+      </p:sp>
+    </p:spTree>
+  </p:cSld>
+  <p:clrMapOvr>
+    <a:masterClrMapping/>
+  </p:clrMapOvr>
+  <p:timing>
+    <p:tnLst>
+      <p:par>
+        <p:cTn id="1" dur="indefinite" restart="never" nodeType="tmRoot"/>
+      </p:par>
+    </p:tnLst>
+  </p:timing>
+</p:sld>
+</file>
+
+<file path=ppt/slides/slide31.xml><?xml version="1.0" encoding="utf-8"?>
+<p:sld xmlns:a="http://schemas.openxmlformats.org/drawingml/2006/main" xmlns:r="http://schemas.openxmlformats.org/officeDocument/2006/relationships" xmlns:p="http://schemas.openxmlformats.org/presentationml/2006/main">
+  <p:cSld>
+    <p:spTree>
+      <p:nvGrpSpPr>
+        <p:cNvPr id="1" name=""/>
+        <p:cNvGrpSpPr/>
+        <p:nvPr/>
+      </p:nvGrpSpPr>
+      <p:grpSpPr>
+        <a:xfrm>
+          <a:off x="0" y="0"/>
+          <a:ext cx="0" cy="0"/>
+          <a:chOff x="0" y="0"/>
+          <a:chExt cx="0" cy="0"/>
+        </a:xfrm>
+      </p:grpSpPr>
+      <p:sp>
+        <p:nvSpPr>
+          <p:cNvPr id="2" name="Título 1"/>
+          <p:cNvSpPr>
+            <a:spLocks noGrp="1"/>
+          </p:cNvSpPr>
+          <p:nvPr>
+            <p:ph type="title"/>
+          </p:nvPr>
+        </p:nvSpPr>
+        <p:spPr>
+          <a:xfrm>
+            <a:off x="457200" y="404664"/>
+            <a:ext cx="8229600" cy="1066800"/>
+          </a:xfrm>
+        </p:spPr>
+        <p:txBody>
+          <a:bodyPr/>
+          <a:lstStyle/>
+          <a:p>
+            <a:r>
+              <a:rPr lang="pt-PT" dirty="0" smtClean="0"/>
+              <a:t>Monitorização de rede</a:t>
+            </a:r>
+            <a:endParaRPr lang="pt-PT" dirty="0"/>
+          </a:p>
+        </p:txBody>
+      </p:sp>
+      <p:sp>
+        <p:nvSpPr>
+          <p:cNvPr id="3" name="Marcador de Posição de Conteúdo 2"/>
+          <p:cNvSpPr>
+            <a:spLocks noGrp="1"/>
+          </p:cNvSpPr>
+          <p:nvPr>
+            <p:ph idx="1"/>
+          </p:nvPr>
+        </p:nvSpPr>
+        <p:spPr>
+          <a:xfrm>
             <a:off x="457200" y="1484784"/>
             <a:ext cx="8229600" cy="4608512"/>
           </a:xfrm>
@@ -18611,7 +18811,7 @@
             <a:fld id="{AC560869-1695-4081-8E6F-05D0DB8947D3}" type="slidenum">
               <a:rPr lang="pt-PT" smtClean="0"/>
               <a:pPr/>
-              <a:t>30</a:t>
+              <a:t>31</a:t>
             </a:fld>
             <a:endParaRPr lang="pt-PT"/>
           </a:p>
@@ -19618,8 +19818,8 @@
         </p:nvSpPr>
         <p:spPr>
           <a:xfrm>
-            <a:off x="395536" y="3861048"/>
-            <a:ext cx="1872208" cy="720080"/>
+            <a:off x="251520" y="4005064"/>
+            <a:ext cx="2016224" cy="792088"/>
           </a:xfrm>
           <a:prstGeom prst="rect">
             <a:avLst/>
@@ -19659,7 +19859,7 @@
         </p:nvSpPr>
         <p:spPr>
           <a:xfrm>
-            <a:off x="2411760" y="3861048"/>
+            <a:off x="2411760" y="4005064"/>
             <a:ext cx="1368152" cy="720080"/>
           </a:xfrm>
           <a:prstGeom prst="rect">
@@ -19700,7 +19900,7 @@
         </p:nvSpPr>
         <p:spPr>
           <a:xfrm>
-            <a:off x="4139952" y="3861048"/>
+            <a:off x="4139952" y="4005064"/>
             <a:ext cx="1656184" cy="720080"/>
           </a:xfrm>
           <a:prstGeom prst="rect">
@@ -19741,7 +19941,7 @@
         </p:nvSpPr>
         <p:spPr>
           <a:xfrm>
-            <a:off x="1259632" y="2996952"/>
+            <a:off x="1259632" y="3131676"/>
             <a:ext cx="1368152" cy="432048"/>
           </a:xfrm>
           <a:prstGeom prst="rect">
@@ -20146,7 +20346,7 @@
         </p:nvSpPr>
         <p:spPr>
           <a:xfrm>
-            <a:off x="1331640" y="3068960"/>
+            <a:off x="1331640" y="3203684"/>
             <a:ext cx="1296144" cy="369332"/>
           </a:xfrm>
           <a:prstGeom prst="rect">
@@ -20176,7 +20376,7 @@
         </p:nvSpPr>
         <p:spPr>
           <a:xfrm>
-            <a:off x="4139952" y="3861048"/>
+            <a:off x="4139952" y="4005064"/>
             <a:ext cx="1872208" cy="584775"/>
           </a:xfrm>
           <a:prstGeom prst="rect">
@@ -20212,7 +20412,7 @@
         </p:nvSpPr>
         <p:spPr>
           <a:xfrm>
-            <a:off x="2411760" y="3933056"/>
+            <a:off x="2411760" y="4077072"/>
             <a:ext cx="1296144" cy="646331"/>
           </a:xfrm>
           <a:prstGeom prst="rect">
@@ -20248,8 +20448,8 @@
         </p:nvSpPr>
         <p:spPr>
           <a:xfrm>
-            <a:off x="467544" y="3861048"/>
-            <a:ext cx="1728192" cy="830997"/>
+            <a:off x="323528" y="4005064"/>
+            <a:ext cx="1800200" cy="830997"/>
           </a:xfrm>
           <a:prstGeom prst="rect">
             <a:avLst/>
@@ -20439,7 +20639,474 @@
   <p:timing>
     <p:tnLst>
       <p:par>
-        <p:cTn id="1" dur="indefinite" restart="never" nodeType="tmRoot"/>
+        <p:cTn id="1" dur="indefinite" restart="never" nodeType="tmRoot">
+          <p:childTnLst>
+            <p:seq concurrent="1" nextAc="seek">
+              <p:cTn id="2" dur="indefinite" nodeType="mainSeq">
+                <p:childTnLst>
+                  <p:par>
+                    <p:cTn id="3" fill="hold">
+                      <p:stCondLst>
+                        <p:cond delay="indefinite"/>
+                      </p:stCondLst>
+                      <p:childTnLst>
+                        <p:par>
+                          <p:cTn id="4" fill="hold">
+                            <p:stCondLst>
+                              <p:cond delay="0"/>
+                            </p:stCondLst>
+                            <p:childTnLst>
+                              <p:par>
+                                <p:cTn id="5" presetID="1" presetClass="emph" presetSubtype="2" fill="hold" nodeType="clickEffect">
+                                  <p:stCondLst>
+                                    <p:cond delay="0"/>
+                                  </p:stCondLst>
+                                  <p:childTnLst>
+                                    <p:animClr clrSpc="rgb">
+                                      <p:cBhvr>
+                                        <p:cTn id="6" dur="2000" fill="hold"/>
+                                        <p:tgtEl>
+                                          <p:spTgt spid="11"/>
+                                        </p:tgtEl>
+                                        <p:attrNameLst>
+                                          <p:attrName>fillcolor</p:attrName>
+                                        </p:attrNameLst>
+                                      </p:cBhvr>
+                                      <p:to>
+                                        <a:schemeClr val="accent2"/>
+                                      </p:to>
+                                    </p:animClr>
+                                    <p:set>
+                                      <p:cBhvr>
+                                        <p:cTn id="7" dur="2000" fill="hold"/>
+                                        <p:tgtEl>
+                                          <p:spTgt spid="11"/>
+                                        </p:tgtEl>
+                                        <p:attrNameLst>
+                                          <p:attrName>fill.type</p:attrName>
+                                        </p:attrNameLst>
+                                      </p:cBhvr>
+                                      <p:to>
+                                        <p:strVal val="solid"/>
+                                      </p:to>
+                                    </p:set>
+                                    <p:set>
+                                      <p:cBhvr>
+                                        <p:cTn id="8" dur="2000" fill="hold"/>
+                                        <p:tgtEl>
+                                          <p:spTgt spid="11"/>
+                                        </p:tgtEl>
+                                        <p:attrNameLst>
+                                          <p:attrName>fill.on</p:attrName>
+                                        </p:attrNameLst>
+                                      </p:cBhvr>
+                                      <p:to>
+                                        <p:strVal val="true"/>
+                                      </p:to>
+                                    </p:set>
+                                  </p:childTnLst>
+                                </p:cTn>
+                              </p:par>
+                              <p:par>
+                                <p:cTn id="9" presetID="1" presetClass="emph" presetSubtype="2" fill="hold" nodeType="withEffect">
+                                  <p:stCondLst>
+                                    <p:cond delay="0"/>
+                                  </p:stCondLst>
+                                  <p:childTnLst>
+                                    <p:animClr clrSpc="rgb">
+                                      <p:cBhvr>
+                                        <p:cTn id="10" dur="2000" fill="hold"/>
+                                        <p:tgtEl>
+                                          <p:spTgt spid="12"/>
+                                        </p:tgtEl>
+                                        <p:attrNameLst>
+                                          <p:attrName>fillcolor</p:attrName>
+                                        </p:attrNameLst>
+                                      </p:cBhvr>
+                                      <p:to>
+                                        <a:schemeClr val="accent2"/>
+                                      </p:to>
+                                    </p:animClr>
+                                    <p:set>
+                                      <p:cBhvr>
+                                        <p:cTn id="11" dur="2000" fill="hold"/>
+                                        <p:tgtEl>
+                                          <p:spTgt spid="12"/>
+                                        </p:tgtEl>
+                                        <p:attrNameLst>
+                                          <p:attrName>fill.type</p:attrName>
+                                        </p:attrNameLst>
+                                      </p:cBhvr>
+                                      <p:to>
+                                        <p:strVal val="solid"/>
+                                      </p:to>
+                                    </p:set>
+                                    <p:set>
+                                      <p:cBhvr>
+                                        <p:cTn id="12" dur="2000" fill="hold"/>
+                                        <p:tgtEl>
+                                          <p:spTgt spid="12"/>
+                                        </p:tgtEl>
+                                        <p:attrNameLst>
+                                          <p:attrName>fill.on</p:attrName>
+                                        </p:attrNameLst>
+                                      </p:cBhvr>
+                                      <p:to>
+                                        <p:strVal val="true"/>
+                                      </p:to>
+                                    </p:set>
+                                  </p:childTnLst>
+                                </p:cTn>
+                              </p:par>
+                              <p:par>
+                                <p:cTn id="13" presetID="1" presetClass="emph" presetSubtype="2" fill="hold" nodeType="withEffect">
+                                  <p:stCondLst>
+                                    <p:cond delay="0"/>
+                                  </p:stCondLst>
+                                  <p:childTnLst>
+                                    <p:animClr clrSpc="rgb">
+                                      <p:cBhvr>
+                                        <p:cTn id="14" dur="2000" fill="hold"/>
+                                        <p:tgtEl>
+                                          <p:spTgt spid="13"/>
+                                        </p:tgtEl>
+                                        <p:attrNameLst>
+                                          <p:attrName>fillcolor</p:attrName>
+                                        </p:attrNameLst>
+                                      </p:cBhvr>
+                                      <p:to>
+                                        <a:schemeClr val="accent2"/>
+                                      </p:to>
+                                    </p:animClr>
+                                    <p:set>
+                                      <p:cBhvr>
+                                        <p:cTn id="15" dur="2000" fill="hold"/>
+                                        <p:tgtEl>
+                                          <p:spTgt spid="13"/>
+                                        </p:tgtEl>
+                                        <p:attrNameLst>
+                                          <p:attrName>fill.type</p:attrName>
+                                        </p:attrNameLst>
+                                      </p:cBhvr>
+                                      <p:to>
+                                        <p:strVal val="solid"/>
+                                      </p:to>
+                                    </p:set>
+                                    <p:set>
+                                      <p:cBhvr>
+                                        <p:cTn id="16" dur="2000" fill="hold"/>
+                                        <p:tgtEl>
+                                          <p:spTgt spid="13"/>
+                                        </p:tgtEl>
+                                        <p:attrNameLst>
+                                          <p:attrName>fill.on</p:attrName>
+                                        </p:attrNameLst>
+                                      </p:cBhvr>
+                                      <p:to>
+                                        <p:strVal val="true"/>
+                                      </p:to>
+                                    </p:set>
+                                  </p:childTnLst>
+                                </p:cTn>
+                              </p:par>
+                              <p:par>
+                                <p:cTn id="17" presetID="1" presetClass="emph" presetSubtype="2" fill="hold" nodeType="withEffect">
+                                  <p:stCondLst>
+                                    <p:cond delay="0"/>
+                                  </p:stCondLst>
+                                  <p:childTnLst>
+                                    <p:animClr clrSpc="rgb">
+                                      <p:cBhvr>
+                                        <p:cTn id="18" dur="2000" fill="hold"/>
+                                        <p:tgtEl>
+                                          <p:spTgt spid="29"/>
+                                        </p:tgtEl>
+                                        <p:attrNameLst>
+                                          <p:attrName>fillcolor</p:attrName>
+                                        </p:attrNameLst>
+                                      </p:cBhvr>
+                                      <p:to>
+                                        <a:schemeClr val="accent2"/>
+                                      </p:to>
+                                    </p:animClr>
+                                    <p:set>
+                                      <p:cBhvr>
+                                        <p:cTn id="19" dur="2000" fill="hold"/>
+                                        <p:tgtEl>
+                                          <p:spTgt spid="29"/>
+                                        </p:tgtEl>
+                                        <p:attrNameLst>
+                                          <p:attrName>fill.type</p:attrName>
+                                        </p:attrNameLst>
+                                      </p:cBhvr>
+                                      <p:to>
+                                        <p:strVal val="solid"/>
+                                      </p:to>
+                                    </p:set>
+                                    <p:set>
+                                      <p:cBhvr>
+                                        <p:cTn id="20" dur="2000" fill="hold"/>
+                                        <p:tgtEl>
+                                          <p:spTgt spid="29"/>
+                                        </p:tgtEl>
+                                        <p:attrNameLst>
+                                          <p:attrName>fill.on</p:attrName>
+                                        </p:attrNameLst>
+                                      </p:cBhvr>
+                                      <p:to>
+                                        <p:strVal val="true"/>
+                                      </p:to>
+                                    </p:set>
+                                  </p:childTnLst>
+                                </p:cTn>
+                              </p:par>
+                              <p:par>
+                                <p:cTn id="21" presetID="1" presetClass="emph" presetSubtype="2" fill="hold" nodeType="withEffect">
+                                  <p:stCondLst>
+                                    <p:cond delay="0"/>
+                                  </p:stCondLst>
+                                  <p:childTnLst>
+                                    <p:animClr clrSpc="rgb">
+                                      <p:cBhvr>
+                                        <p:cTn id="22" dur="2000" fill="hold"/>
+                                        <p:tgtEl>
+                                          <p:spTgt spid="30"/>
+                                        </p:tgtEl>
+                                        <p:attrNameLst>
+                                          <p:attrName>fillcolor</p:attrName>
+                                        </p:attrNameLst>
+                                      </p:cBhvr>
+                                      <p:to>
+                                        <a:schemeClr val="accent2"/>
+                                      </p:to>
+                                    </p:animClr>
+                                    <p:set>
+                                      <p:cBhvr>
+                                        <p:cTn id="23" dur="2000" fill="hold"/>
+                                        <p:tgtEl>
+                                          <p:spTgt spid="30"/>
+                                        </p:tgtEl>
+                                        <p:attrNameLst>
+                                          <p:attrName>fill.type</p:attrName>
+                                        </p:attrNameLst>
+                                      </p:cBhvr>
+                                      <p:to>
+                                        <p:strVal val="solid"/>
+                                      </p:to>
+                                    </p:set>
+                                    <p:set>
+                                      <p:cBhvr>
+                                        <p:cTn id="24" dur="2000" fill="hold"/>
+                                        <p:tgtEl>
+                                          <p:spTgt spid="30"/>
+                                        </p:tgtEl>
+                                        <p:attrNameLst>
+                                          <p:attrName>fill.on</p:attrName>
+                                        </p:attrNameLst>
+                                      </p:cBhvr>
+                                      <p:to>
+                                        <p:strVal val="true"/>
+                                      </p:to>
+                                    </p:set>
+                                  </p:childTnLst>
+                                </p:cTn>
+                              </p:par>
+                              <p:par>
+                                <p:cTn id="25" presetID="1" presetClass="emph" presetSubtype="2" fill="hold" nodeType="withEffect">
+                                  <p:stCondLst>
+                                    <p:cond delay="0"/>
+                                  </p:stCondLst>
+                                  <p:childTnLst>
+                                    <p:animClr clrSpc="rgb">
+                                      <p:cBhvr>
+                                        <p:cTn id="26" dur="2000" fill="hold"/>
+                                        <p:tgtEl>
+                                          <p:spTgt spid="10"/>
+                                        </p:tgtEl>
+                                        <p:attrNameLst>
+                                          <p:attrName>fillcolor</p:attrName>
+                                        </p:attrNameLst>
+                                      </p:cBhvr>
+                                      <p:to>
+                                        <a:schemeClr val="accent2"/>
+                                      </p:to>
+                                    </p:animClr>
+                                    <p:set>
+                                      <p:cBhvr>
+                                        <p:cTn id="27" dur="2000" fill="hold"/>
+                                        <p:tgtEl>
+                                          <p:spTgt spid="10"/>
+                                        </p:tgtEl>
+                                        <p:attrNameLst>
+                                          <p:attrName>fill.type</p:attrName>
+                                        </p:attrNameLst>
+                                      </p:cBhvr>
+                                      <p:to>
+                                        <p:strVal val="solid"/>
+                                      </p:to>
+                                    </p:set>
+                                    <p:set>
+                                      <p:cBhvr>
+                                        <p:cTn id="28" dur="2000" fill="hold"/>
+                                        <p:tgtEl>
+                                          <p:spTgt spid="10"/>
+                                        </p:tgtEl>
+                                        <p:attrNameLst>
+                                          <p:attrName>fill.on</p:attrName>
+                                        </p:attrNameLst>
+                                      </p:cBhvr>
+                                      <p:to>
+                                        <p:strVal val="true"/>
+                                      </p:to>
+                                    </p:set>
+                                  </p:childTnLst>
+                                </p:cTn>
+                              </p:par>
+                              <p:par>
+                                <p:cTn id="29" presetID="1" presetClass="emph" presetSubtype="2" fill="hold" nodeType="withEffect">
+                                  <p:stCondLst>
+                                    <p:cond delay="0"/>
+                                  </p:stCondLst>
+                                  <p:childTnLst>
+                                    <p:animClr clrSpc="rgb">
+                                      <p:cBhvr>
+                                        <p:cTn id="30" dur="2000" fill="hold"/>
+                                        <p:tgtEl>
+                                          <p:spTgt spid="25"/>
+                                        </p:tgtEl>
+                                        <p:attrNameLst>
+                                          <p:attrName>fillcolor</p:attrName>
+                                        </p:attrNameLst>
+                                      </p:cBhvr>
+                                      <p:to>
+                                        <a:schemeClr val="accent2"/>
+                                      </p:to>
+                                    </p:animClr>
+                                    <p:set>
+                                      <p:cBhvr>
+                                        <p:cTn id="31" dur="2000" fill="hold"/>
+                                        <p:tgtEl>
+                                          <p:spTgt spid="25"/>
+                                        </p:tgtEl>
+                                        <p:attrNameLst>
+                                          <p:attrName>fill.type</p:attrName>
+                                        </p:attrNameLst>
+                                      </p:cBhvr>
+                                      <p:to>
+                                        <p:strVal val="solid"/>
+                                      </p:to>
+                                    </p:set>
+                                    <p:set>
+                                      <p:cBhvr>
+                                        <p:cTn id="32" dur="2000" fill="hold"/>
+                                        <p:tgtEl>
+                                          <p:spTgt spid="25"/>
+                                        </p:tgtEl>
+                                        <p:attrNameLst>
+                                          <p:attrName>fill.on</p:attrName>
+                                        </p:attrNameLst>
+                                      </p:cBhvr>
+                                      <p:to>
+                                        <p:strVal val="true"/>
+                                      </p:to>
+                                    </p:set>
+                                  </p:childTnLst>
+                                </p:cTn>
+                              </p:par>
+                            </p:childTnLst>
+                          </p:cTn>
+                        </p:par>
+                      </p:childTnLst>
+                    </p:cTn>
+                  </p:par>
+                  <p:par>
+                    <p:cTn id="33" fill="hold">
+                      <p:stCondLst>
+                        <p:cond delay="indefinite"/>
+                      </p:stCondLst>
+                      <p:childTnLst>
+                        <p:par>
+                          <p:cTn id="34" fill="hold">
+                            <p:stCondLst>
+                              <p:cond delay="0"/>
+                            </p:stCondLst>
+                            <p:childTnLst>
+                              <p:par>
+                                <p:cTn id="35" presetID="1" presetClass="emph" presetSubtype="2" fill="hold" nodeType="clickEffect">
+                                  <p:stCondLst>
+                                    <p:cond delay="0"/>
+                                  </p:stCondLst>
+                                  <p:childTnLst>
+                                    <p:animClr clrSpc="rgb">
+                                      <p:cBhvr>
+                                        <p:cTn id="36" dur="2000" fill="hold"/>
+                                        <p:tgtEl>
+                                          <p:spTgt spid="17"/>
+                                        </p:tgtEl>
+                                        <p:attrNameLst>
+                                          <p:attrName>fillcolor</p:attrName>
+                                        </p:attrNameLst>
+                                      </p:cBhvr>
+                                      <p:to>
+                                        <a:schemeClr val="accent2"/>
+                                      </p:to>
+                                    </p:animClr>
+                                    <p:set>
+                                      <p:cBhvr>
+                                        <p:cTn id="37" dur="2000" fill="hold"/>
+                                        <p:tgtEl>
+                                          <p:spTgt spid="17"/>
+                                        </p:tgtEl>
+                                        <p:attrNameLst>
+                                          <p:attrName>fill.type</p:attrName>
+                                        </p:attrNameLst>
+                                      </p:cBhvr>
+                                      <p:to>
+                                        <p:strVal val="solid"/>
+                                      </p:to>
+                                    </p:set>
+                                    <p:set>
+                                      <p:cBhvr>
+                                        <p:cTn id="38" dur="2000" fill="hold"/>
+                                        <p:tgtEl>
+                                          <p:spTgt spid="17"/>
+                                        </p:tgtEl>
+                                        <p:attrNameLst>
+                                          <p:attrName>fill.on</p:attrName>
+                                        </p:attrNameLst>
+                                      </p:cBhvr>
+                                      <p:to>
+                                        <p:strVal val="true"/>
+                                      </p:to>
+                                    </p:set>
+                                  </p:childTnLst>
+                                </p:cTn>
+                              </p:par>
+                            </p:childTnLst>
+                          </p:cTn>
+                        </p:par>
+                      </p:childTnLst>
+                    </p:cTn>
+                  </p:par>
+                </p:childTnLst>
+              </p:cTn>
+              <p:prevCondLst>
+                <p:cond evt="onPrev" delay="0">
+                  <p:tgtEl>
+                    <p:sldTgt/>
+                  </p:tgtEl>
+                </p:cond>
+              </p:prevCondLst>
+              <p:nextCondLst>
+                <p:cond evt="onNext" delay="0">
+                  <p:tgtEl>
+                    <p:sldTgt/>
+                  </p:tgtEl>
+                </p:cond>
+              </p:nextCondLst>
+            </p:seq>
+          </p:childTnLst>
+        </p:cTn>
       </p:par>
     </p:tnLst>
   </p:timing>

</xml_diff>

<commit_message>
alteracao para italico duas palavras
</commit_message>
<xml_diff>
--- a/doc/apresentacao_dissertacao.pptx
+++ b/doc/apresentacao_dissertacao.pptx
@@ -12870,9 +12870,35 @@
             <a:endParaRPr lang="pt-PT" dirty="0" smtClean="0"/>
           </a:p>
           <a:p>
+            <a:pPr>
+              <a:buNone/>
+            </a:pPr>
+            <a:endParaRPr lang="pt-PT" dirty="0" smtClean="0"/>
+          </a:p>
+          <a:p>
             <a:r>
               <a:rPr lang="pt-PT" dirty="0" smtClean="0"/>
-              <a:t>Pode ser online ou offline</a:t>
+              <a:t>Pode ser </a:t>
+            </a:r>
+            <a:r>
+              <a:rPr lang="pt-PT" dirty="0" err="1" smtClean="0"/>
+              <a:t>efectuada</a:t>
+            </a:r>
+            <a:r>
+              <a:rPr lang="pt-PT" dirty="0" smtClean="0"/>
+              <a:t> de modo </a:t>
+            </a:r>
+            <a:r>
+              <a:rPr lang="pt-PT" i="1" dirty="0" smtClean="0"/>
+              <a:t>online</a:t>
+            </a:r>
+            <a:r>
+              <a:rPr lang="pt-PT" dirty="0" smtClean="0"/>
+              <a:t> ou </a:t>
+            </a:r>
+            <a:r>
+              <a:rPr lang="pt-PT" i="1" dirty="0" smtClean="0"/>
+              <a:t>offline</a:t>
             </a:r>
           </a:p>
           <a:p>

</xml_diff>